<commit_message>
Edits throughout the guide + parameter descriptions in .yaml files
</commit_message>
<xml_diff>
--- a/docs/images/Intersystems IRIS architechture diagram.pptx
+++ b/docs/images/Intersystems IRIS architechture diagram.pptx
@@ -261,7 +261,7 @@
           <a:p>
             <a:fld id="{779E2B3B-B180-B64C-893F-CCFC190F335F}" type="datetimeFigureOut">
               <a:rPr lang="en-US" smtClean="0"/>
-              <a:t>1/21/2021</a:t>
+              <a:t>1/27/2021</a:t>
             </a:fld>
             <a:endParaRPr lang="en-US" dirty="0"/>
           </a:p>
@@ -459,7 +459,7 @@
           <a:p>
             <a:fld id="{779E2B3B-B180-B64C-893F-CCFC190F335F}" type="datetimeFigureOut">
               <a:rPr lang="en-US" smtClean="0"/>
-              <a:t>1/21/2021</a:t>
+              <a:t>1/27/2021</a:t>
             </a:fld>
             <a:endParaRPr lang="en-US" dirty="0"/>
           </a:p>
@@ -667,7 +667,7 @@
           <a:p>
             <a:fld id="{779E2B3B-B180-B64C-893F-CCFC190F335F}" type="datetimeFigureOut">
               <a:rPr lang="en-US" smtClean="0"/>
-              <a:t>1/21/2021</a:t>
+              <a:t>1/27/2021</a:t>
             </a:fld>
             <a:endParaRPr lang="en-US" dirty="0"/>
           </a:p>
@@ -865,7 +865,7 @@
           <a:p>
             <a:fld id="{779E2B3B-B180-B64C-893F-CCFC190F335F}" type="datetimeFigureOut">
               <a:rPr lang="en-US" smtClean="0"/>
-              <a:t>1/21/2021</a:t>
+              <a:t>1/27/2021</a:t>
             </a:fld>
             <a:endParaRPr lang="en-US" dirty="0"/>
           </a:p>
@@ -1140,7 +1140,7 @@
           <a:p>
             <a:fld id="{779E2B3B-B180-B64C-893F-CCFC190F335F}" type="datetimeFigureOut">
               <a:rPr lang="en-US" smtClean="0"/>
-              <a:t>1/21/2021</a:t>
+              <a:t>1/27/2021</a:t>
             </a:fld>
             <a:endParaRPr lang="en-US" dirty="0"/>
           </a:p>
@@ -1405,7 +1405,7 @@
           <a:p>
             <a:fld id="{779E2B3B-B180-B64C-893F-CCFC190F335F}" type="datetimeFigureOut">
               <a:rPr lang="en-US" smtClean="0"/>
-              <a:t>1/21/2021</a:t>
+              <a:t>1/27/2021</a:t>
             </a:fld>
             <a:endParaRPr lang="en-US" dirty="0"/>
           </a:p>
@@ -1817,7 +1817,7 @@
           <a:p>
             <a:fld id="{779E2B3B-B180-B64C-893F-CCFC190F335F}" type="datetimeFigureOut">
               <a:rPr lang="en-US" smtClean="0"/>
-              <a:t>1/21/2021</a:t>
+              <a:t>1/27/2021</a:t>
             </a:fld>
             <a:endParaRPr lang="en-US" dirty="0"/>
           </a:p>
@@ -1958,7 +1958,7 @@
           <a:p>
             <a:fld id="{779E2B3B-B180-B64C-893F-CCFC190F335F}" type="datetimeFigureOut">
               <a:rPr lang="en-US" smtClean="0"/>
-              <a:t>1/21/2021</a:t>
+              <a:t>1/27/2021</a:t>
             </a:fld>
             <a:endParaRPr lang="en-US" dirty="0"/>
           </a:p>
@@ -2071,7 +2071,7 @@
           <a:p>
             <a:fld id="{779E2B3B-B180-B64C-893F-CCFC190F335F}" type="datetimeFigureOut">
               <a:rPr lang="en-US" smtClean="0"/>
-              <a:t>1/21/2021</a:t>
+              <a:t>1/27/2021</a:t>
             </a:fld>
             <a:endParaRPr lang="en-US" dirty="0"/>
           </a:p>
@@ -2382,7 +2382,7 @@
           <a:p>
             <a:fld id="{779E2B3B-B180-B64C-893F-CCFC190F335F}" type="datetimeFigureOut">
               <a:rPr lang="en-US" smtClean="0"/>
-              <a:t>1/21/2021</a:t>
+              <a:t>1/27/2021</a:t>
             </a:fld>
             <a:endParaRPr lang="en-US" dirty="0"/>
           </a:p>
@@ -2670,7 +2670,7 @@
           <a:p>
             <a:fld id="{779E2B3B-B180-B64C-893F-CCFC190F335F}" type="datetimeFigureOut">
               <a:rPr lang="en-US" smtClean="0"/>
-              <a:t>1/21/2021</a:t>
+              <a:t>1/27/2021</a:t>
             </a:fld>
             <a:endParaRPr lang="en-US" dirty="0"/>
           </a:p>
@@ -2911,7 +2911,7 @@
           <a:p>
             <a:fld id="{779E2B3B-B180-B64C-893F-CCFC190F335F}" type="datetimeFigureOut">
               <a:rPr lang="en-US" smtClean="0"/>
-              <a:t>1/21/2021</a:t>
+              <a:t>1/27/2021</a:t>
             </a:fld>
             <a:endParaRPr lang="en-US" dirty="0"/>
           </a:p>
@@ -6467,6 +6467,125 @@
           </a:extLst>
         </p:spPr>
       </p:pic>
+      <p:pic>
+        <p:nvPicPr>
+          <p:cNvPr id="51" name="Graphic 60">
+            <a:extLst>
+              <a:ext uri="{FF2B5EF4-FFF2-40B4-BE49-F238E27FC236}">
+                <a16:creationId xmlns:a16="http://schemas.microsoft.com/office/drawing/2014/main" id="{D5F1E014-1AF5-0442-BA6E-37B0D94AA4A6}"/>
+              </a:ext>
+            </a:extLst>
+          </p:cNvPr>
+          <p:cNvPicPr>
+            <a:picLocks noChangeAspect="1" noChangeArrowheads="1"/>
+          </p:cNvPicPr>
+          <p:nvPr/>
+        </p:nvPicPr>
+        <p:blipFill>
+          <a:blip r:embed="rId20">
+            <a:extLst>
+              <a:ext uri="{BEBA8EAE-BF5A-486C-A8C5-ECC9F3942E4B}">
+                <a14:imgProps xmlns:a14="http://schemas.microsoft.com/office/drawing/2010/main">
+                  <a14:imgLayer r:embed="rId21">
+                    <a14:imgEffect>
+                      <a14:artisticBlur/>
+                    </a14:imgEffect>
+                  </a14:imgLayer>
+                </a14:imgProps>
+              </a:ext>
+              <a:ext uri="{28A0092B-C50C-407E-A947-70E740481C1C}">
+                <a14:useLocalDpi xmlns:a14="http://schemas.microsoft.com/office/drawing/2010/main" val="0"/>
+              </a:ext>
+            </a:extLst>
+          </a:blip>
+          <a:srcRect/>
+          <a:stretch>
+            <a:fillRect/>
+          </a:stretch>
+        </p:blipFill>
+        <p:spPr bwMode="auto">
+          <a:xfrm>
+            <a:off x="5693685" y="2032349"/>
+            <a:ext cx="457200" cy="457200"/>
+          </a:xfrm>
+          <a:prstGeom prst="rect">
+            <a:avLst/>
+          </a:prstGeom>
+          <a:noFill/>
+          <a:ln>
+            <a:noFill/>
+          </a:ln>
+          <a:extLst>
+            <a:ext uri="{909E8E84-426E-40DD-AFC4-6F175D3DCCD1}">
+              <a14:hiddenFill xmlns:a14="http://schemas.microsoft.com/office/drawing/2010/main">
+                <a:solidFill>
+                  <a:srgbClr val="FFFFFF"/>
+                </a:solidFill>
+              </a14:hiddenFill>
+            </a:ext>
+            <a:ext uri="{91240B29-F687-4F45-9708-019B960494DF}">
+              <a14:hiddenLine xmlns:a14="http://schemas.microsoft.com/office/drawing/2010/main" w="9525">
+                <a:solidFill>
+                  <a:srgbClr val="000000"/>
+                </a:solidFill>
+                <a:miter lim="800000"/>
+                <a:headEnd/>
+                <a:tailEnd/>
+              </a14:hiddenLine>
+            </a:ext>
+          </a:extLst>
+        </p:spPr>
+      </p:pic>
+      <p:sp>
+        <p:nvSpPr>
+          <p:cNvPr id="56" name="TextBox 55">
+            <a:extLst>
+              <a:ext uri="{FF2B5EF4-FFF2-40B4-BE49-F238E27FC236}">
+                <a16:creationId xmlns:a16="http://schemas.microsoft.com/office/drawing/2014/main" id="{CF275322-8821-7240-9DD9-59D35F667125}"/>
+              </a:ext>
+            </a:extLst>
+          </p:cNvPr>
+          <p:cNvSpPr txBox="1"/>
+          <p:nvPr/>
+        </p:nvSpPr>
+        <p:spPr>
+          <a:xfrm>
+            <a:off x="5016655" y="2442594"/>
+            <a:ext cx="1769070" cy="276999"/>
+          </a:xfrm>
+          <a:prstGeom prst="rect">
+            <a:avLst/>
+          </a:prstGeom>
+          <a:noFill/>
+        </p:spPr>
+        <p:txBody>
+          <a:bodyPr wrap="square" rtlCol="0">
+            <a:spAutoFit/>
+          </a:bodyPr>
+          <a:lstStyle/>
+          <a:p>
+            <a:pPr algn="ctr"/>
+            <a:r>
+              <a:rPr lang="en-US" sz="1200" dirty="0">
+                <a:latin typeface="Arial" panose="020B0604020202020204" pitchFamily="34" charset="0"/>
+                <a:cs typeface="Arial" panose="020B0604020202020204" pitchFamily="34" charset="0"/>
+              </a:rPr>
+              <a:t>Bastion </a:t>
+            </a:r>
+            <a:r>
+              <a:rPr lang="en-US" sz="1200" dirty="0" smtClean="0">
+                <a:latin typeface="Arial" panose="020B0604020202020204" pitchFamily="34" charset="0"/>
+                <a:cs typeface="Arial" panose="020B0604020202020204" pitchFamily="34" charset="0"/>
+              </a:rPr>
+              <a:t>host</a:t>
+            </a:r>
+            <a:endParaRPr lang="en-US" sz="1200" dirty="0">
+              <a:latin typeface="Arial" panose="020B0604020202020204" pitchFamily="34" charset="0"/>
+              <a:cs typeface="Arial" panose="020B0604020202020204" pitchFamily="34" charset="0"/>
+            </a:endParaRPr>
+          </a:p>
+        </p:txBody>
+      </p:sp>
     </p:spTree>
     <p:extLst>
       <p:ext uri="{BB962C8B-B14F-4D97-AF65-F5344CB8AC3E}">
@@ -6511,7 +6630,7 @@
         </p:nvSpPr>
         <p:spPr>
           <a:xfrm>
-            <a:off x="4033712" y="1752170"/>
+            <a:off x="4206097" y="3221205"/>
             <a:ext cx="2841222" cy="2261030"/>
           </a:xfrm>
           <a:prstGeom prst="rect">
@@ -6660,7 +6779,7 @@
         </p:nvSpPr>
         <p:spPr>
           <a:xfrm>
-            <a:off x="3428215" y="642347"/>
+            <a:off x="3600600" y="2111382"/>
             <a:ext cx="3853118" cy="3751854"/>
           </a:xfrm>
           <a:prstGeom prst="rect">
@@ -6740,7 +6859,7 @@
         </p:blipFill>
         <p:spPr>
           <a:xfrm>
-            <a:off x="3428215" y="642346"/>
+            <a:off x="3600600" y="2111381"/>
             <a:ext cx="330200" cy="330200"/>
           </a:xfrm>
           <a:prstGeom prst="rect">
@@ -6762,7 +6881,7 @@
         </p:nvSpPr>
         <p:spPr bwMode="auto">
           <a:xfrm>
-            <a:off x="3914544" y="983924"/>
+            <a:off x="4086929" y="2452959"/>
             <a:ext cx="3104323" cy="3291744"/>
           </a:xfrm>
           <a:prstGeom prst="rect">
@@ -6863,7 +6982,7 @@
         </p:blipFill>
         <p:spPr>
           <a:xfrm>
-            <a:off x="3492726" y="1340292"/>
+            <a:off x="3665111" y="2809327"/>
             <a:ext cx="330200" cy="330200"/>
           </a:xfrm>
           <a:prstGeom prst="rect">
@@ -6885,7 +7004,7 @@
         </p:nvSpPr>
         <p:spPr bwMode="auto">
           <a:xfrm>
-            <a:off x="3497551" y="1336845"/>
+            <a:off x="3669936" y="2805880"/>
             <a:ext cx="3648316" cy="2837222"/>
           </a:xfrm>
           <a:prstGeom prst="rect">
@@ -6970,7 +7089,7 @@
         </p:blipFill>
         <p:spPr bwMode="auto">
           <a:xfrm>
-            <a:off x="4033712" y="1752735"/>
+            <a:off x="4206097" y="3221770"/>
             <a:ext cx="273050" cy="274637"/>
           </a:xfrm>
           <a:prstGeom prst="rect">
@@ -7029,7 +7148,7 @@
         </p:blipFill>
         <p:spPr>
           <a:xfrm>
-            <a:off x="5237654" y="2463884"/>
+            <a:off x="5410039" y="3932919"/>
             <a:ext cx="469900" cy="469900"/>
           </a:xfrm>
           <a:prstGeom prst="rect">
@@ -7051,7 +7170,7 @@
         </p:nvSpPr>
         <p:spPr>
           <a:xfrm>
-            <a:off x="4511040" y="3353314"/>
+            <a:off x="4683425" y="4822349"/>
             <a:ext cx="1884199" cy="461665"/>
           </a:xfrm>
           <a:prstGeom prst="rect">
@@ -7117,7 +7236,7 @@
         </p:nvSpPr>
         <p:spPr>
           <a:xfrm>
-            <a:off x="4418826" y="2122179"/>
+            <a:off x="4591211" y="3591214"/>
             <a:ext cx="2048934" cy="1768142"/>
           </a:xfrm>
           <a:prstGeom prst="rect">
@@ -7197,7 +7316,7 @@
         </p:blipFill>
         <p:spPr bwMode="auto">
           <a:xfrm>
-            <a:off x="5250354" y="2925635"/>
+            <a:off x="5422739" y="4394670"/>
             <a:ext cx="457200" cy="457200"/>
           </a:xfrm>
           <a:prstGeom prst="rect">
@@ -7228,6 +7347,55 @@
           </a:extLst>
         </p:spPr>
       </p:pic>
+      <p:sp>
+        <p:nvSpPr>
+          <p:cNvPr id="15" name="TextBox 14">
+            <a:extLst>
+              <a:ext uri="{FF2B5EF4-FFF2-40B4-BE49-F238E27FC236}">
+                <a16:creationId xmlns:a16="http://schemas.microsoft.com/office/drawing/2014/main" id="{3801DBBB-7205-B74C-A173-6D5401D93A49}"/>
+              </a:ext>
+            </a:extLst>
+          </p:cNvPr>
+          <p:cNvSpPr txBox="1"/>
+          <p:nvPr/>
+        </p:nvSpPr>
+        <p:spPr>
+          <a:xfrm>
+            <a:off x="2686603" y="1129085"/>
+            <a:ext cx="5716276" cy="276999"/>
+          </a:xfrm>
+          <a:prstGeom prst="rect">
+            <a:avLst/>
+          </a:prstGeom>
+          <a:noFill/>
+        </p:spPr>
+        <p:txBody>
+          <a:bodyPr wrap="square" rtlCol="0">
+            <a:spAutoFit/>
+          </a:bodyPr>
+          <a:lstStyle/>
+          <a:p>
+            <a:pPr algn="ctr"/>
+            <a:r>
+              <a:rPr lang="en-US" sz="1200" dirty="0" smtClean="0">
+                <a:solidFill>
+                  <a:srgbClr val="FF0000"/>
+                </a:solidFill>
+                <a:latin typeface="Arial" panose="020B0604020202020204" pitchFamily="34" charset="0"/>
+                <a:cs typeface="Arial" panose="020B0604020202020204" pitchFamily="34" charset="0"/>
+              </a:rPr>
+              <a:t>The deployment guide doesn’t seem to need this diagram.</a:t>
+            </a:r>
+            <a:endParaRPr lang="en-US" sz="1200" dirty="0">
+              <a:solidFill>
+                <a:srgbClr val="FF0000"/>
+              </a:solidFill>
+              <a:latin typeface="Arial" panose="020B0604020202020204" pitchFamily="34" charset="0"/>
+              <a:cs typeface="Arial" panose="020B0604020202020204" pitchFamily="34" charset="0"/>
+            </a:endParaRPr>
+          </a:p>
+        </p:txBody>
+      </p:sp>
     </p:spTree>
     <p:extLst>
       <p:ext uri="{BB962C8B-B14F-4D97-AF65-F5344CB8AC3E}">
@@ -9457,6 +9625,141 @@
           </a:prstGeom>
         </p:spPr>
       </p:pic>
+      <p:cxnSp>
+        <p:nvCxnSpPr>
+          <p:cNvPr id="51" name="Straight Arrow Connector 50">
+            <a:extLst>
+              <a:ext uri="{FF2B5EF4-FFF2-40B4-BE49-F238E27FC236}">
+                <a16:creationId xmlns:a16="http://schemas.microsoft.com/office/drawing/2014/main" id="{5A9D33BB-F7AF-C044-9BA5-6F98953C5C41}"/>
+              </a:ext>
+            </a:extLst>
+          </p:cNvPr>
+          <p:cNvCxnSpPr/>
+          <p:nvPr/>
+        </p:nvCxnSpPr>
+        <p:spPr>
+          <a:xfrm flipV="1">
+            <a:off x="147648" y="247339"/>
+            <a:ext cx="11272341" cy="6490740"/>
+          </a:xfrm>
+          <a:prstGeom prst="straightConnector1">
+            <a:avLst/>
+          </a:prstGeom>
+          <a:ln w="12700">
+            <a:solidFill>
+              <a:schemeClr val="tx2"/>
+            </a:solidFill>
+            <a:headEnd type="none" w="med" len="sm"/>
+            <a:tailEnd type="none" w="med" len="sm"/>
+          </a:ln>
+        </p:spPr>
+        <p:style>
+          <a:lnRef idx="1">
+            <a:schemeClr val="accent1"/>
+          </a:lnRef>
+          <a:fillRef idx="0">
+            <a:schemeClr val="accent1"/>
+          </a:fillRef>
+          <a:effectRef idx="0">
+            <a:schemeClr val="accent1"/>
+          </a:effectRef>
+          <a:fontRef idx="minor">
+            <a:schemeClr val="tx1"/>
+          </a:fontRef>
+        </p:style>
+      </p:cxnSp>
+      <p:cxnSp>
+        <p:nvCxnSpPr>
+          <p:cNvPr id="69" name="Straight Arrow Connector 68">
+            <a:extLst>
+              <a:ext uri="{FF2B5EF4-FFF2-40B4-BE49-F238E27FC236}">
+                <a16:creationId xmlns:a16="http://schemas.microsoft.com/office/drawing/2014/main" id="{5A9D33BB-F7AF-C044-9BA5-6F98953C5C41}"/>
+              </a:ext>
+            </a:extLst>
+          </p:cNvPr>
+          <p:cNvCxnSpPr/>
+          <p:nvPr/>
+        </p:nvCxnSpPr>
+        <p:spPr>
+          <a:xfrm flipH="1" flipV="1">
+            <a:off x="233882" y="399739"/>
+            <a:ext cx="11820179" cy="6116951"/>
+          </a:xfrm>
+          <a:prstGeom prst="straightConnector1">
+            <a:avLst/>
+          </a:prstGeom>
+          <a:ln w="12700">
+            <a:solidFill>
+              <a:schemeClr val="tx2"/>
+            </a:solidFill>
+            <a:headEnd type="none" w="med" len="sm"/>
+            <a:tailEnd type="none" w="med" len="sm"/>
+          </a:ln>
+        </p:spPr>
+        <p:style>
+          <a:lnRef idx="1">
+            <a:schemeClr val="accent1"/>
+          </a:lnRef>
+          <a:fillRef idx="0">
+            <a:schemeClr val="accent1"/>
+          </a:fillRef>
+          <a:effectRef idx="0">
+            <a:schemeClr val="accent1"/>
+          </a:effectRef>
+          <a:fontRef idx="minor">
+            <a:schemeClr val="tx1"/>
+          </a:fontRef>
+        </p:style>
+      </p:cxnSp>
+      <p:sp>
+        <p:nvSpPr>
+          <p:cNvPr id="70" name="TextBox 69">
+            <a:extLst>
+              <a:ext uri="{FF2B5EF4-FFF2-40B4-BE49-F238E27FC236}">
+                <a16:creationId xmlns:a16="http://schemas.microsoft.com/office/drawing/2014/main" id="{3801DBBB-7205-B74C-A173-6D5401D93A49}"/>
+              </a:ext>
+            </a:extLst>
+          </p:cNvPr>
+          <p:cNvSpPr txBox="1"/>
+          <p:nvPr/>
+        </p:nvSpPr>
+        <p:spPr>
+          <a:xfrm>
+            <a:off x="3241456" y="242944"/>
+            <a:ext cx="5716276" cy="276999"/>
+          </a:xfrm>
+          <a:prstGeom prst="rect">
+            <a:avLst/>
+          </a:prstGeom>
+          <a:noFill/>
+        </p:spPr>
+        <p:txBody>
+          <a:bodyPr wrap="square" rtlCol="0">
+            <a:spAutoFit/>
+          </a:bodyPr>
+          <a:lstStyle/>
+          <a:p>
+            <a:pPr algn="ctr"/>
+            <a:r>
+              <a:rPr lang="en-US" sz="1200" dirty="0" smtClean="0">
+                <a:solidFill>
+                  <a:srgbClr val="FF0000"/>
+                </a:solidFill>
+                <a:latin typeface="Arial" panose="020B0604020202020204" pitchFamily="34" charset="0"/>
+                <a:cs typeface="Arial" panose="020B0604020202020204" pitchFamily="34" charset="0"/>
+              </a:rPr>
+              <a:t>If we need a diagram like this (private subnets only), model it on Slide 1.</a:t>
+            </a:r>
+            <a:endParaRPr lang="en-US" sz="1200" dirty="0">
+              <a:solidFill>
+                <a:srgbClr val="FF0000"/>
+              </a:solidFill>
+              <a:latin typeface="Arial" panose="020B0604020202020204" pitchFamily="34" charset="0"/>
+              <a:cs typeface="Arial" panose="020B0604020202020204" pitchFamily="34" charset="0"/>
+            </a:endParaRPr>
+          </a:p>
+        </p:txBody>
+      </p:sp>
     </p:spTree>
     <p:extLst>
       <p:ext uri="{BB962C8B-B14F-4D97-AF65-F5344CB8AC3E}">

</xml_diff>

<commit_message>
More edits to the guide
</commit_message>
<xml_diff>
--- a/docs/images/Intersystems IRIS architechture diagram.pptx
+++ b/docs/images/Intersystems IRIS architechture diagram.pptx
@@ -3824,7 +3824,7 @@
           <a:blip r:embed="rId2">
             <a:extLst>
               <a:ext uri="{96DAC541-7B7A-43D3-8B79-37D633B846F1}">
-                <asvg:svgBlip xmlns="" xmlns:asvg="http://schemas.microsoft.com/office/drawing/2016/SVG/main" r:embed="rId3"/>
+                <asvg:svgBlip xmlns:asvg="http://schemas.microsoft.com/office/drawing/2016/SVG/main" xmlns="" r:embed="rId3"/>
               </a:ext>
             </a:extLst>
           </a:blip>
@@ -3860,7 +3860,7 @@
           <a:blip r:embed="rId4">
             <a:extLst>
               <a:ext uri="{96DAC541-7B7A-43D3-8B79-37D633B846F1}">
-                <asvg:svgBlip xmlns="" xmlns:asvg="http://schemas.microsoft.com/office/drawing/2016/SVG/main" r:embed="rId5"/>
+                <asvg:svgBlip xmlns:asvg="http://schemas.microsoft.com/office/drawing/2016/SVG/main" xmlns="" r:embed="rId5"/>
               </a:ext>
             </a:extLst>
           </a:blip>
@@ -4120,7 +4120,7 @@
           <a:blip r:embed="rId6">
             <a:extLst>
               <a:ext uri="{96DAC541-7B7A-43D3-8B79-37D633B846F1}">
-                <asvg:svgBlip xmlns="" xmlns:asvg="http://schemas.microsoft.com/office/drawing/2016/SVG/main" r:embed="rId11"/>
+                <asvg:svgBlip xmlns:asvg="http://schemas.microsoft.com/office/drawing/2016/SVG/main" xmlns="" r:embed="rId11"/>
               </a:ext>
             </a:extLst>
           </a:blip>
@@ -6436,7 +6436,7 @@
           <a:blip r:embed="rId2">
             <a:extLst>
               <a:ext uri="{96DAC541-7B7A-43D3-8B79-37D633B846F1}">
-                <asvg:svgBlip xmlns="" xmlns:asvg="http://schemas.microsoft.com/office/drawing/2016/SVG/main" r:embed="rId3"/>
+                <asvg:svgBlip xmlns:asvg="http://schemas.microsoft.com/office/drawing/2016/SVG/main" xmlns="" r:embed="rId3"/>
               </a:ext>
             </a:extLst>
           </a:blip>
@@ -6472,7 +6472,7 @@
           <a:blip r:embed="rId4">
             <a:extLst>
               <a:ext uri="{96DAC541-7B7A-43D3-8B79-37D633B846F1}">
-                <asvg:svgBlip xmlns="" xmlns:asvg="http://schemas.microsoft.com/office/drawing/2016/SVG/main" r:embed="rId5"/>
+                <asvg:svgBlip xmlns:asvg="http://schemas.microsoft.com/office/drawing/2016/SVG/main" xmlns="" r:embed="rId5"/>
               </a:ext>
             </a:extLst>
           </a:blip>
@@ -6732,7 +6732,7 @@
           <a:blip r:embed="rId6">
             <a:extLst>
               <a:ext uri="{96DAC541-7B7A-43D3-8B79-37D633B846F1}">
-                <asvg:svgBlip xmlns="" xmlns:asvg="http://schemas.microsoft.com/office/drawing/2016/SVG/main" r:embed="rId11"/>
+                <asvg:svgBlip xmlns:asvg="http://schemas.microsoft.com/office/drawing/2016/SVG/main" xmlns="" r:embed="rId11"/>
               </a:ext>
             </a:extLst>
           </a:blip>
@@ -9199,6 +9199,141 @@
           </a:p>
         </p:txBody>
       </p:sp>
+      <p:cxnSp>
+        <p:nvCxnSpPr>
+          <p:cNvPr id="57" name="Straight Arrow Connector 56">
+            <a:extLst>
+              <a:ext uri="{FF2B5EF4-FFF2-40B4-BE49-F238E27FC236}">
+                <a16:creationId xmlns:a16="http://schemas.microsoft.com/office/drawing/2014/main" id="{5A9D33BB-F7AF-C044-9BA5-6F98953C5C41}"/>
+              </a:ext>
+            </a:extLst>
+          </p:cNvPr>
+          <p:cNvCxnSpPr/>
+          <p:nvPr/>
+        </p:nvCxnSpPr>
+        <p:spPr>
+          <a:xfrm flipV="1">
+            <a:off x="147648" y="247339"/>
+            <a:ext cx="11272341" cy="6490740"/>
+          </a:xfrm>
+          <a:prstGeom prst="straightConnector1">
+            <a:avLst/>
+          </a:prstGeom>
+          <a:ln w="12700">
+            <a:solidFill>
+              <a:schemeClr val="tx2"/>
+            </a:solidFill>
+            <a:headEnd type="none" w="med" len="sm"/>
+            <a:tailEnd type="none" w="med" len="sm"/>
+          </a:ln>
+        </p:spPr>
+        <p:style>
+          <a:lnRef idx="1">
+            <a:schemeClr val="accent1"/>
+          </a:lnRef>
+          <a:fillRef idx="0">
+            <a:schemeClr val="accent1"/>
+          </a:fillRef>
+          <a:effectRef idx="0">
+            <a:schemeClr val="accent1"/>
+          </a:effectRef>
+          <a:fontRef idx="minor">
+            <a:schemeClr val="tx1"/>
+          </a:fontRef>
+        </p:style>
+      </p:cxnSp>
+      <p:cxnSp>
+        <p:nvCxnSpPr>
+          <p:cNvPr id="58" name="Straight Arrow Connector 57">
+            <a:extLst>
+              <a:ext uri="{FF2B5EF4-FFF2-40B4-BE49-F238E27FC236}">
+                <a16:creationId xmlns:a16="http://schemas.microsoft.com/office/drawing/2014/main" id="{5A9D33BB-F7AF-C044-9BA5-6F98953C5C41}"/>
+              </a:ext>
+            </a:extLst>
+          </p:cNvPr>
+          <p:cNvCxnSpPr/>
+          <p:nvPr/>
+        </p:nvCxnSpPr>
+        <p:spPr>
+          <a:xfrm flipH="1" flipV="1">
+            <a:off x="233882" y="399739"/>
+            <a:ext cx="11820179" cy="6116951"/>
+          </a:xfrm>
+          <a:prstGeom prst="straightConnector1">
+            <a:avLst/>
+          </a:prstGeom>
+          <a:ln w="12700">
+            <a:solidFill>
+              <a:schemeClr val="tx2"/>
+            </a:solidFill>
+            <a:headEnd type="none" w="med" len="sm"/>
+            <a:tailEnd type="none" w="med" len="sm"/>
+          </a:ln>
+        </p:spPr>
+        <p:style>
+          <a:lnRef idx="1">
+            <a:schemeClr val="accent1"/>
+          </a:lnRef>
+          <a:fillRef idx="0">
+            <a:schemeClr val="accent1"/>
+          </a:fillRef>
+          <a:effectRef idx="0">
+            <a:schemeClr val="accent1"/>
+          </a:effectRef>
+          <a:fontRef idx="minor">
+            <a:schemeClr val="tx1"/>
+          </a:fontRef>
+        </p:style>
+      </p:cxnSp>
+      <p:sp>
+        <p:nvSpPr>
+          <p:cNvPr id="59" name="TextBox 58">
+            <a:extLst>
+              <a:ext uri="{FF2B5EF4-FFF2-40B4-BE49-F238E27FC236}">
+                <a16:creationId xmlns:a16="http://schemas.microsoft.com/office/drawing/2014/main" id="{3801DBBB-7205-B74C-A173-6D5401D93A49}"/>
+              </a:ext>
+            </a:extLst>
+          </p:cNvPr>
+          <p:cNvSpPr txBox="1"/>
+          <p:nvPr/>
+        </p:nvSpPr>
+        <p:spPr>
+          <a:xfrm>
+            <a:off x="3241455" y="242944"/>
+            <a:ext cx="5933847" cy="276999"/>
+          </a:xfrm>
+          <a:prstGeom prst="rect">
+            <a:avLst/>
+          </a:prstGeom>
+          <a:noFill/>
+        </p:spPr>
+        <p:txBody>
+          <a:bodyPr wrap="square" rtlCol="0">
+            <a:spAutoFit/>
+          </a:bodyPr>
+          <a:lstStyle/>
+          <a:p>
+            <a:pPr algn="ctr"/>
+            <a:r>
+              <a:rPr lang="en-US" sz="1200" dirty="0" smtClean="0">
+                <a:solidFill>
+                  <a:srgbClr val="FF0000"/>
+                </a:solidFill>
+                <a:latin typeface="Arial" panose="020B0604020202020204" pitchFamily="34" charset="0"/>
+                <a:cs typeface="Arial" panose="020B0604020202020204" pitchFamily="34" charset="0"/>
+              </a:rPr>
+              <a:t>We aren’t showing the service icons.</a:t>
+            </a:r>
+            <a:endParaRPr lang="en-US" sz="1200" dirty="0">
+              <a:solidFill>
+                <a:srgbClr val="FF0000"/>
+              </a:solidFill>
+              <a:latin typeface="Arial" panose="020B0604020202020204" pitchFamily="34" charset="0"/>
+              <a:cs typeface="Arial" panose="020B0604020202020204" pitchFamily="34" charset="0"/>
+            </a:endParaRPr>
+          </a:p>
+        </p:txBody>
+      </p:sp>
     </p:spTree>
     <p:extLst>
       <p:ext uri="{BB962C8B-B14F-4D97-AF65-F5344CB8AC3E}">
@@ -9462,7 +9597,7 @@
           <a:blip r:embed="rId2">
             <a:extLst>
               <a:ext uri="{96DAC541-7B7A-43D3-8B79-37D633B846F1}">
-                <asvg:svgBlip xmlns="" xmlns:asvg="http://schemas.microsoft.com/office/drawing/2016/SVG/main" r:embed="rId3"/>
+                <asvg:svgBlip xmlns:asvg="http://schemas.microsoft.com/office/drawing/2016/SVG/main" xmlns="" r:embed="rId3"/>
               </a:ext>
             </a:extLst>
           </a:blip>
@@ -9585,7 +9720,7 @@
           <a:blip r:embed="rId4">
             <a:extLst>
               <a:ext uri="{96DAC541-7B7A-43D3-8B79-37D633B846F1}">
-                <asvg:svgBlip xmlns="" xmlns:asvg="http://schemas.microsoft.com/office/drawing/2016/SVG/main" r:embed="rId5"/>
+                <asvg:svgBlip xmlns:asvg="http://schemas.microsoft.com/office/drawing/2016/SVG/main" xmlns="" r:embed="rId5"/>
               </a:ext>
             </a:extLst>
           </a:blip>
@@ -9751,7 +9886,7 @@
           <a:blip r:embed="rId7">
             <a:extLst>
               <a:ext uri="{96DAC541-7B7A-43D3-8B79-37D633B846F1}">
-                <asvg:svgBlip xmlns="" xmlns:asvg="http://schemas.microsoft.com/office/drawing/2016/SVG/main" r:embed="rId9"/>
+                <asvg:svgBlip xmlns:asvg="http://schemas.microsoft.com/office/drawing/2016/SVG/main" xmlns="" r:embed="rId9"/>
               </a:ext>
             </a:extLst>
           </a:blip>
@@ -10448,7 +10583,7 @@
           <a:blip r:embed="rId2">
             <a:extLst>
               <a:ext uri="{96DAC541-7B7A-43D3-8B79-37D633B846F1}">
-                <asvg:svgBlip xmlns="" xmlns:asvg="http://schemas.microsoft.com/office/drawing/2016/SVG/main" r:embed="rId3"/>
+                <asvg:svgBlip xmlns:asvg="http://schemas.microsoft.com/office/drawing/2016/SVG/main" xmlns="" r:embed="rId3"/>
               </a:ext>
             </a:extLst>
           </a:blip>
@@ -10484,7 +10619,7 @@
           <a:blip r:embed="rId4">
             <a:extLst>
               <a:ext uri="{96DAC541-7B7A-43D3-8B79-37D633B846F1}">
-                <asvg:svgBlip xmlns="" xmlns:asvg="http://schemas.microsoft.com/office/drawing/2016/SVG/main" r:embed="rId5"/>
+                <asvg:svgBlip xmlns:asvg="http://schemas.microsoft.com/office/drawing/2016/SVG/main" xmlns="" r:embed="rId5"/>
               </a:ext>
             </a:extLst>
           </a:blip>
@@ -10631,7 +10766,7 @@
           <a:blip r:embed="rId6">
             <a:extLst>
               <a:ext uri="{96DAC541-7B7A-43D3-8B79-37D633B846F1}">
-                <asvg:svgBlip xmlns="" xmlns:asvg="http://schemas.microsoft.com/office/drawing/2016/SVG/main" r:embed="rId7"/>
+                <asvg:svgBlip xmlns:asvg="http://schemas.microsoft.com/office/drawing/2016/SVG/main" xmlns="" r:embed="rId7"/>
               </a:ext>
             </a:extLst>
           </a:blip>
@@ -10709,7 +10844,7 @@
           <a:blip r:embed="rId8">
             <a:extLst>
               <a:ext uri="{96DAC541-7B7A-43D3-8B79-37D633B846F1}">
-                <asvg:svgBlip xmlns="" xmlns:asvg="http://schemas.microsoft.com/office/drawing/2016/SVG/main" r:embed="rId9"/>
+                <asvg:svgBlip xmlns:asvg="http://schemas.microsoft.com/office/drawing/2016/SVG/main" xmlns="" r:embed="rId9"/>
               </a:ext>
             </a:extLst>
           </a:blip>
@@ -10797,7 +10932,7 @@
           <a:blip r:embed="rId10">
             <a:extLst>
               <a:ext uri="{96DAC541-7B7A-43D3-8B79-37D633B846F1}">
-                <asvg:svgBlip xmlns="" xmlns:asvg="http://schemas.microsoft.com/office/drawing/2016/SVG/main" r:embed="rId11"/>
+                <asvg:svgBlip xmlns:asvg="http://schemas.microsoft.com/office/drawing/2016/SVG/main" xmlns="" r:embed="rId11"/>
               </a:ext>
             </a:extLst>
           </a:blip>
@@ -11073,7 +11208,7 @@
           <a:blip r:embed="rId6">
             <a:extLst>
               <a:ext uri="{96DAC541-7B7A-43D3-8B79-37D633B846F1}">
-                <asvg:svgBlip xmlns="" xmlns:asvg="http://schemas.microsoft.com/office/drawing/2016/SVG/main" r:embed="rId7"/>
+                <asvg:svgBlip xmlns:asvg="http://schemas.microsoft.com/office/drawing/2016/SVG/main" xmlns="" r:embed="rId7"/>
               </a:ext>
             </a:extLst>
           </a:blip>
@@ -11176,7 +11311,7 @@
           <a:blip r:embed="rId6">
             <a:extLst>
               <a:ext uri="{96DAC541-7B7A-43D3-8B79-37D633B846F1}">
-                <asvg:svgBlip xmlns="" xmlns:asvg="http://schemas.microsoft.com/office/drawing/2016/SVG/main" r:embed="rId7"/>
+                <asvg:svgBlip xmlns:asvg="http://schemas.microsoft.com/office/drawing/2016/SVG/main" xmlns="" r:embed="rId7"/>
               </a:ext>
             </a:extLst>
           </a:blip>
@@ -11296,7 +11431,7 @@
           <a:blip r:embed="rId8">
             <a:extLst>
               <a:ext uri="{96DAC541-7B7A-43D3-8B79-37D633B846F1}">
-                <asvg:svgBlip xmlns="" xmlns:asvg="http://schemas.microsoft.com/office/drawing/2016/SVG/main" r:embed="rId9"/>
+                <asvg:svgBlip xmlns:asvg="http://schemas.microsoft.com/office/drawing/2016/SVG/main" xmlns="" r:embed="rId9"/>
               </a:ext>
             </a:extLst>
           </a:blip>
@@ -11371,7 +11506,7 @@
           <a:blip r:embed="rId8">
             <a:extLst>
               <a:ext uri="{96DAC541-7B7A-43D3-8B79-37D633B846F1}">
-                <asvg:svgBlip xmlns="" xmlns:asvg="http://schemas.microsoft.com/office/drawing/2016/SVG/main" r:embed="rId9"/>
+                <asvg:svgBlip xmlns:asvg="http://schemas.microsoft.com/office/drawing/2016/SVG/main" xmlns="" r:embed="rId9"/>
               </a:ext>
             </a:extLst>
           </a:blip>
@@ -11563,7 +11698,7 @@
           <a:blip r:embed="rId12">
             <a:extLst>
               <a:ext uri="{96DAC541-7B7A-43D3-8B79-37D633B846F1}">
-                <asvg:svgBlip xmlns="" xmlns:asvg="http://schemas.microsoft.com/office/drawing/2016/SVG/main" r:embed="rId13"/>
+                <asvg:svgBlip xmlns:asvg="http://schemas.microsoft.com/office/drawing/2016/SVG/main" xmlns="" r:embed="rId13"/>
               </a:ext>
             </a:extLst>
           </a:blip>
@@ -12031,7 +12166,7 @@
           <a:blip r:embed="rId14">
             <a:extLst>
               <a:ext uri="{96DAC541-7B7A-43D3-8B79-37D633B846F1}">
-                <asvg:svgBlip xmlns="" xmlns:asvg="http://schemas.microsoft.com/office/drawing/2016/SVG/main" r:embed="rId15"/>
+                <asvg:svgBlip xmlns:asvg="http://schemas.microsoft.com/office/drawing/2016/SVG/main" xmlns="" r:embed="rId15"/>
               </a:ext>
             </a:extLst>
           </a:blip>
@@ -12145,7 +12280,7 @@
           <a:blip r:embed="rId16">
             <a:extLst>
               <a:ext uri="{96DAC541-7B7A-43D3-8B79-37D633B846F1}">
-                <asvg:svgBlip xmlns="" xmlns:asvg="http://schemas.microsoft.com/office/drawing/2016/SVG/main" r:embed="rId17"/>
+                <asvg:svgBlip xmlns:asvg="http://schemas.microsoft.com/office/drawing/2016/SVG/main" xmlns="" r:embed="rId17"/>
               </a:ext>
             </a:extLst>
           </a:blip>
@@ -12220,7 +12355,7 @@
           <a:blip r:embed="rId18">
             <a:extLst>
               <a:ext uri="{96DAC541-7B7A-43D3-8B79-37D633B846F1}">
-                <asvg:svgBlip xmlns="" xmlns:asvg="http://schemas.microsoft.com/office/drawing/2016/SVG/main" r:embed="rId19"/>
+                <asvg:svgBlip xmlns:asvg="http://schemas.microsoft.com/office/drawing/2016/SVG/main" xmlns="" r:embed="rId19"/>
               </a:ext>
             </a:extLst>
           </a:blip>
@@ -12338,8 +12473,8 @@
         </p:nvSpPr>
         <p:spPr>
           <a:xfrm>
-            <a:off x="3241456" y="242944"/>
-            <a:ext cx="5716276" cy="276999"/>
+            <a:off x="3241455" y="242944"/>
+            <a:ext cx="5933847" cy="276999"/>
           </a:xfrm>
           <a:prstGeom prst="rect">
             <a:avLst/>
@@ -12361,7 +12496,17 @@
                 <a:latin typeface="Arial" panose="020B0604020202020204" pitchFamily="34" charset="0"/>
                 <a:cs typeface="Arial" panose="020B0604020202020204" pitchFamily="34" charset="0"/>
               </a:rPr>
-              <a:t>If we need a diagram like this (private subnets only), model it on Slide 1.</a:t>
+              <a:t>If we need a diagram like this (private subnets only), model it on </a:t>
+            </a:r>
+            <a:r>
+              <a:rPr lang="en-US" sz="1200" dirty="0" smtClean="0">
+                <a:solidFill>
+                  <a:srgbClr val="FF0000"/>
+                </a:solidFill>
+                <a:latin typeface="Arial" panose="020B0604020202020204" pitchFamily="34" charset="0"/>
+                <a:cs typeface="Arial" panose="020B0604020202020204" pitchFamily="34" charset="0"/>
+              </a:rPr>
+              <a:t>the main diagram.</a:t>
             </a:r>
             <a:endParaRPr lang="en-US" sz="1200" dirty="0">
               <a:solidFill>

</xml_diff>

<commit_message>
Updates per Daniel's feedback w Dave's go-ahead
</commit_message>
<xml_diff>
--- a/docs/images/Intersystems IRIS architechture diagram.pptx
+++ b/docs/images/Intersystems IRIS architechture diagram.pptx
@@ -262,7 +262,7 @@
           <a:p>
             <a:fld id="{779E2B3B-B180-B64C-893F-CCFC190F335F}" type="datetimeFigureOut">
               <a:rPr lang="en-US" smtClean="0"/>
-              <a:t>1/29/2021</a:t>
+              <a:t>2/1/2021</a:t>
             </a:fld>
             <a:endParaRPr lang="en-US" dirty="0"/>
           </a:p>
@@ -460,7 +460,7 @@
           <a:p>
             <a:fld id="{779E2B3B-B180-B64C-893F-CCFC190F335F}" type="datetimeFigureOut">
               <a:rPr lang="en-US" smtClean="0"/>
-              <a:t>1/29/2021</a:t>
+              <a:t>2/1/2021</a:t>
             </a:fld>
             <a:endParaRPr lang="en-US" dirty="0"/>
           </a:p>
@@ -668,7 +668,7 @@
           <a:p>
             <a:fld id="{779E2B3B-B180-B64C-893F-CCFC190F335F}" type="datetimeFigureOut">
               <a:rPr lang="en-US" smtClean="0"/>
-              <a:t>1/29/2021</a:t>
+              <a:t>2/1/2021</a:t>
             </a:fld>
             <a:endParaRPr lang="en-US" dirty="0"/>
           </a:p>
@@ -866,7 +866,7 @@
           <a:p>
             <a:fld id="{779E2B3B-B180-B64C-893F-CCFC190F335F}" type="datetimeFigureOut">
               <a:rPr lang="en-US" smtClean="0"/>
-              <a:t>1/29/2021</a:t>
+              <a:t>2/1/2021</a:t>
             </a:fld>
             <a:endParaRPr lang="en-US" dirty="0"/>
           </a:p>
@@ -1141,7 +1141,7 @@
           <a:p>
             <a:fld id="{779E2B3B-B180-B64C-893F-CCFC190F335F}" type="datetimeFigureOut">
               <a:rPr lang="en-US" smtClean="0"/>
-              <a:t>1/29/2021</a:t>
+              <a:t>2/1/2021</a:t>
             </a:fld>
             <a:endParaRPr lang="en-US" dirty="0"/>
           </a:p>
@@ -1406,7 +1406,7 @@
           <a:p>
             <a:fld id="{779E2B3B-B180-B64C-893F-CCFC190F335F}" type="datetimeFigureOut">
               <a:rPr lang="en-US" smtClean="0"/>
-              <a:t>1/29/2021</a:t>
+              <a:t>2/1/2021</a:t>
             </a:fld>
             <a:endParaRPr lang="en-US" dirty="0"/>
           </a:p>
@@ -1818,7 +1818,7 @@
           <a:p>
             <a:fld id="{779E2B3B-B180-B64C-893F-CCFC190F335F}" type="datetimeFigureOut">
               <a:rPr lang="en-US" smtClean="0"/>
-              <a:t>1/29/2021</a:t>
+              <a:t>2/1/2021</a:t>
             </a:fld>
             <a:endParaRPr lang="en-US" dirty="0"/>
           </a:p>
@@ -1959,7 +1959,7 @@
           <a:p>
             <a:fld id="{779E2B3B-B180-B64C-893F-CCFC190F335F}" type="datetimeFigureOut">
               <a:rPr lang="en-US" smtClean="0"/>
-              <a:t>1/29/2021</a:t>
+              <a:t>2/1/2021</a:t>
             </a:fld>
             <a:endParaRPr lang="en-US" dirty="0"/>
           </a:p>
@@ -2072,7 +2072,7 @@
           <a:p>
             <a:fld id="{779E2B3B-B180-B64C-893F-CCFC190F335F}" type="datetimeFigureOut">
               <a:rPr lang="en-US" smtClean="0"/>
-              <a:t>1/29/2021</a:t>
+              <a:t>2/1/2021</a:t>
             </a:fld>
             <a:endParaRPr lang="en-US" dirty="0"/>
           </a:p>
@@ -2383,7 +2383,7 @@
           <a:p>
             <a:fld id="{779E2B3B-B180-B64C-893F-CCFC190F335F}" type="datetimeFigureOut">
               <a:rPr lang="en-US" smtClean="0"/>
-              <a:t>1/29/2021</a:t>
+              <a:t>2/1/2021</a:t>
             </a:fld>
             <a:endParaRPr lang="en-US" dirty="0"/>
           </a:p>
@@ -2671,7 +2671,7 @@
           <a:p>
             <a:fld id="{779E2B3B-B180-B64C-893F-CCFC190F335F}" type="datetimeFigureOut">
               <a:rPr lang="en-US" smtClean="0"/>
-              <a:t>1/29/2021</a:t>
+              <a:t>2/1/2021</a:t>
             </a:fld>
             <a:endParaRPr lang="en-US" dirty="0"/>
           </a:p>
@@ -2912,7 +2912,7 @@
           <a:p>
             <a:fld id="{779E2B3B-B180-B64C-893F-CCFC190F335F}" type="datetimeFigureOut">
               <a:rPr lang="en-US" smtClean="0"/>
-              <a:t>1/29/2021</a:t>
+              <a:t>2/1/2021</a:t>
             </a:fld>
             <a:endParaRPr lang="en-US" dirty="0"/>
           </a:p>
@@ -3331,6 +3331,59 @@
       </p:grpSpPr>
       <p:sp>
         <p:nvSpPr>
+          <p:cNvPr id="57" name="TextBox 56">
+            <a:extLst>
+              <a:ext uri="{FF2B5EF4-FFF2-40B4-BE49-F238E27FC236}">
+                <a16:creationId xmlns:a16="http://schemas.microsoft.com/office/drawing/2014/main" id="{6B638165-16FA-A646-A545-A7BD93A3AF6A}"/>
+              </a:ext>
+            </a:extLst>
+          </p:cNvPr>
+          <p:cNvSpPr txBox="1"/>
+          <p:nvPr/>
+        </p:nvSpPr>
+        <p:spPr>
+          <a:xfrm>
+            <a:off x="6452115" y="4697673"/>
+            <a:ext cx="1769070" cy="461665"/>
+          </a:xfrm>
+          <a:prstGeom prst="rect">
+            <a:avLst/>
+          </a:prstGeom>
+          <a:noFill/>
+        </p:spPr>
+        <p:txBody>
+          <a:bodyPr wrap="square" rtlCol="0">
+            <a:spAutoFit/>
+          </a:bodyPr>
+          <a:lstStyle/>
+          <a:p>
+            <a:pPr algn="ctr"/>
+            <a:r>
+              <a:rPr lang="en-US" sz="1200" i="1" dirty="0" smtClean="0">
+                <a:latin typeface="Arial" panose="020B0604020202020204" pitchFamily="34" charset="0"/>
+                <a:cs typeface="Arial" panose="020B0604020202020204" pitchFamily="34" charset="0"/>
+              </a:rPr>
+              <a:t>Health</a:t>
+            </a:r>
+          </a:p>
+          <a:p>
+            <a:pPr algn="ctr"/>
+            <a:r>
+              <a:rPr lang="en-US" sz="1200" i="1" dirty="0" smtClean="0">
+                <a:latin typeface="Arial" panose="020B0604020202020204" pitchFamily="34" charset="0"/>
+                <a:cs typeface="Arial" panose="020B0604020202020204" pitchFamily="34" charset="0"/>
+              </a:rPr>
+              <a:t>check</a:t>
+            </a:r>
+            <a:endParaRPr lang="en-US" sz="1200" i="1" dirty="0">
+              <a:latin typeface="Arial" panose="020B0604020202020204" pitchFamily="34" charset="0"/>
+              <a:cs typeface="Arial" panose="020B0604020202020204" pitchFamily="34" charset="0"/>
+            </a:endParaRPr>
+          </a:p>
+        </p:txBody>
+      </p:sp>
+      <p:sp>
+        <p:nvSpPr>
           <p:cNvPr id="97" name="Rectangle 96">
             <a:extLst>
               <a:ext uri="{FF2B5EF4-FFF2-40B4-BE49-F238E27FC236}">
@@ -3343,8 +3396,8 @@
         </p:nvSpPr>
         <p:spPr>
           <a:xfrm>
-            <a:off x="7611080" y="3179211"/>
-            <a:ext cx="2133548" cy="2163337"/>
+            <a:off x="7713950" y="3321259"/>
+            <a:ext cx="2133548" cy="1996465"/>
           </a:xfrm>
           <a:prstGeom prst="rect">
             <a:avLst/>
@@ -3415,8 +3468,8 @@
         </p:nvSpPr>
         <p:spPr>
           <a:xfrm>
-            <a:off x="797822" y="1621857"/>
-            <a:ext cx="2133548" cy="1226818"/>
+            <a:off x="797822" y="1621856"/>
+            <a:ext cx="2133548" cy="1328655"/>
           </a:xfrm>
           <a:prstGeom prst="rect">
             <a:avLst/>
@@ -3487,8 +3540,8 @@
         </p:nvSpPr>
         <p:spPr>
           <a:xfrm>
-            <a:off x="4827437" y="3176105"/>
-            <a:ext cx="2133548" cy="2163337"/>
+            <a:off x="4827437" y="3318153"/>
+            <a:ext cx="2133548" cy="1999571"/>
           </a:xfrm>
           <a:prstGeom prst="rect">
             <a:avLst/>
@@ -3559,8 +3612,8 @@
         </p:nvSpPr>
         <p:spPr>
           <a:xfrm>
-            <a:off x="806687" y="3271547"/>
-            <a:ext cx="2124683" cy="2067896"/>
+            <a:off x="806687" y="3321259"/>
+            <a:ext cx="2124683" cy="1996465"/>
           </a:xfrm>
           <a:prstGeom prst="rect">
             <a:avLst/>
@@ -3617,52 +3670,6 @@
           </a:p>
         </p:txBody>
       </p:sp>
-      <p:cxnSp>
-        <p:nvCxnSpPr>
-          <p:cNvPr id="50" name="Straight Arrow Connector 49">
-            <a:extLst>
-              <a:ext uri="{FF2B5EF4-FFF2-40B4-BE49-F238E27FC236}">
-                <a16:creationId xmlns:a16="http://schemas.microsoft.com/office/drawing/2014/main" id="{239B9CCA-9EF0-3346-BB60-0E30B232B75B}"/>
-              </a:ext>
-            </a:extLst>
-          </p:cNvPr>
-          <p:cNvCxnSpPr>
-            <a:cxnSpLocks/>
-          </p:cNvCxnSpPr>
-          <p:nvPr/>
-        </p:nvCxnSpPr>
-        <p:spPr>
-          <a:xfrm>
-            <a:off x="2154773" y="4716379"/>
-            <a:ext cx="6318504" cy="0"/>
-          </a:xfrm>
-          <a:prstGeom prst="straightConnector1">
-            <a:avLst/>
-          </a:prstGeom>
-          <a:ln w="12700">
-            <a:solidFill>
-              <a:srgbClr val="545B64"/>
-            </a:solidFill>
-            <a:prstDash val="lgDash"/>
-            <a:headEnd type="arrow" w="med" len="sm"/>
-            <a:tailEnd type="arrow" w="med" len="sm"/>
-          </a:ln>
-        </p:spPr>
-        <p:style>
-          <a:lnRef idx="1">
-            <a:schemeClr val="accent1"/>
-          </a:lnRef>
-          <a:fillRef idx="0">
-            <a:schemeClr val="accent1"/>
-          </a:fillRef>
-          <a:effectRef idx="0">
-            <a:schemeClr val="accent1"/>
-          </a:effectRef>
-          <a:fontRef idx="minor">
-            <a:schemeClr val="tx1"/>
-          </a:fontRef>
-        </p:style>
-      </p:cxnSp>
       <p:sp>
         <p:nvSpPr>
           <p:cNvPr id="2" name="Slide Number Placeholder 1">
@@ -3824,7 +3831,7 @@
           <a:blip r:embed="rId2">
             <a:extLst>
               <a:ext uri="{96DAC541-7B7A-43D3-8B79-37D633B846F1}">
-                <asvg:svgBlip xmlns:asvg="http://schemas.microsoft.com/office/drawing/2016/SVG/main" xmlns="" r:embed="rId3"/>
+                <asvg:svgBlip xmlns="" xmlns:asvg="http://schemas.microsoft.com/office/drawing/2016/SVG/main" r:embed="rId3"/>
               </a:ext>
             </a:extLst>
           </a:blip>
@@ -3860,7 +3867,7 @@
           <a:blip r:embed="rId4">
             <a:extLst>
               <a:ext uri="{96DAC541-7B7A-43D3-8B79-37D633B846F1}">
-                <asvg:svgBlip xmlns:asvg="http://schemas.microsoft.com/office/drawing/2016/SVG/main" xmlns="" r:embed="rId5"/>
+                <asvg:svgBlip xmlns="" xmlns:asvg="http://schemas.microsoft.com/office/drawing/2016/SVG/main" r:embed="rId5"/>
               </a:ext>
             </a:extLst>
           </a:blip>
@@ -3892,8 +3899,8 @@
         </p:nvSpPr>
         <p:spPr>
           <a:xfrm>
-            <a:off x="4972712" y="4755023"/>
-            <a:ext cx="1769070" cy="276999"/>
+            <a:off x="5003561" y="4764009"/>
+            <a:ext cx="1769070" cy="461665"/>
           </a:xfrm>
           <a:prstGeom prst="rect">
             <a:avLst/>
@@ -3912,14 +3919,27 @@
                 <a:latin typeface="Arial" panose="020B0604020202020204" pitchFamily="34" charset="0"/>
                 <a:cs typeface="Arial" panose="020B0604020202020204" pitchFamily="34" charset="0"/>
               </a:rPr>
-              <a:t>IRIS m</a:t>
+              <a:t>IRIS </a:t>
             </a:r>
             <a:r>
               <a:rPr lang="en-US" sz="1200" dirty="0" smtClean="0">
                 <a:latin typeface="Arial" panose="020B0604020202020204" pitchFamily="34" charset="0"/>
                 <a:cs typeface="Arial" panose="020B0604020202020204" pitchFamily="34" charset="0"/>
               </a:rPr>
-              <a:t>irror node </a:t>
+              <a:t>mirror</a:t>
+            </a:r>
+            <a:br>
+              <a:rPr lang="en-US" sz="1200" dirty="0" smtClean="0">
+                <a:latin typeface="Arial" panose="020B0604020202020204" pitchFamily="34" charset="0"/>
+                <a:cs typeface="Arial" panose="020B0604020202020204" pitchFamily="34" charset="0"/>
+              </a:rPr>
+            </a:br>
+            <a:r>
+              <a:rPr lang="en-US" sz="1200" dirty="0" smtClean="0">
+                <a:latin typeface="Arial" panose="020B0604020202020204" pitchFamily="34" charset="0"/>
+                <a:cs typeface="Arial" panose="020B0604020202020204" pitchFamily="34" charset="0"/>
+              </a:rPr>
+              <a:t>node </a:t>
             </a:r>
             <a:r>
               <a:rPr lang="en-US" sz="1200" dirty="0">
@@ -3945,8 +3965,8 @@
         </p:nvSpPr>
         <p:spPr>
           <a:xfrm>
-            <a:off x="1159330" y="4190829"/>
-            <a:ext cx="5418752" cy="906938"/>
+            <a:off x="1159330" y="4235218"/>
+            <a:ext cx="5418752" cy="1009016"/>
           </a:xfrm>
           <a:prstGeom prst="rect">
             <a:avLst/>
@@ -4010,8 +4030,8 @@
         </p:nvSpPr>
         <p:spPr>
           <a:xfrm>
-            <a:off x="1010624" y="4755023"/>
-            <a:ext cx="1769070" cy="276999"/>
+            <a:off x="984044" y="4764009"/>
+            <a:ext cx="1769070" cy="461665"/>
           </a:xfrm>
           <a:prstGeom prst="rect">
             <a:avLst/>
@@ -4037,7 +4057,27 @@
                 <a:latin typeface="Arial" panose="020B0604020202020204" pitchFamily="34" charset="0"/>
                 <a:cs typeface="Arial" panose="020B0604020202020204" pitchFamily="34" charset="0"/>
               </a:rPr>
-              <a:t>irror node </a:t>
+              <a:t>irror </a:t>
+            </a:r>
+            <a:r>
+              <a:rPr lang="en-US" sz="1200" dirty="0" smtClean="0">
+                <a:latin typeface="Arial" panose="020B0604020202020204" pitchFamily="34" charset="0"/>
+                <a:cs typeface="Arial" panose="020B0604020202020204" pitchFamily="34" charset="0"/>
+              </a:rPr>
+              <a:t/>
+            </a:r>
+            <a:br>
+              <a:rPr lang="en-US" sz="1200" dirty="0" smtClean="0">
+                <a:latin typeface="Arial" panose="020B0604020202020204" pitchFamily="34" charset="0"/>
+                <a:cs typeface="Arial" panose="020B0604020202020204" pitchFamily="34" charset="0"/>
+              </a:rPr>
+            </a:br>
+            <a:r>
+              <a:rPr lang="en-US" sz="1200" dirty="0" smtClean="0">
+                <a:latin typeface="Arial" panose="020B0604020202020204" pitchFamily="34" charset="0"/>
+                <a:cs typeface="Arial" panose="020B0604020202020204" pitchFamily="34" charset="0"/>
+              </a:rPr>
+              <a:t>node </a:t>
             </a:r>
             <a:r>
               <a:rPr lang="en-US" sz="1200" dirty="0">
@@ -4063,7 +4103,7 @@
         </p:nvSpPr>
         <p:spPr>
           <a:xfrm>
-            <a:off x="2742503" y="3293016"/>
+            <a:off x="2742503" y="3550476"/>
             <a:ext cx="2274152" cy="276999"/>
           </a:xfrm>
           <a:prstGeom prst="rect">
@@ -4078,19 +4118,12 @@
           <a:lstStyle/>
           <a:p>
             <a:pPr algn="ctr"/>
-            <a:r>
-              <a:rPr lang="en-US" sz="1200" dirty="0">
-                <a:latin typeface="Arial" panose="020B0604020202020204" pitchFamily="34" charset="0"/>
-                <a:cs typeface="Arial" panose="020B0604020202020204" pitchFamily="34" charset="0"/>
-              </a:rPr>
-              <a:t>Network </a:t>
-            </a:r>
             <a:r>
               <a:rPr lang="en-US" sz="1200" dirty="0" smtClean="0">
                 <a:latin typeface="Arial" panose="020B0604020202020204" pitchFamily="34" charset="0"/>
                 <a:cs typeface="Arial" panose="020B0604020202020204" pitchFamily="34" charset="0"/>
               </a:rPr>
-              <a:t>Load </a:t>
+              <a:t>Network Load </a:t>
             </a:r>
             <a:r>
               <a:rPr lang="en-US" sz="1200" dirty="0">
@@ -4120,7 +4153,7 @@
           <a:blip r:embed="rId6">
             <a:extLst>
               <a:ext uri="{96DAC541-7B7A-43D3-8B79-37D633B846F1}">
-                <asvg:svgBlip xmlns:asvg="http://schemas.microsoft.com/office/drawing/2016/SVG/main" xmlns="" r:embed="rId11"/>
+                <asvg:svgBlip xmlns="" xmlns:asvg="http://schemas.microsoft.com/office/drawing/2016/SVG/main" r:embed="rId11"/>
               </a:ext>
             </a:extLst>
           </a:blip>
@@ -4130,7 +4163,7 @@
         </p:blipFill>
         <p:spPr>
           <a:xfrm>
-            <a:off x="3644629" y="2825345"/>
+            <a:off x="3644629" y="3109439"/>
             <a:ext cx="469900" cy="469900"/>
           </a:xfrm>
           <a:prstGeom prst="rect">
@@ -4152,8 +4185,8 @@
         </p:nvSpPr>
         <p:spPr>
           <a:xfrm rot="16200000">
-            <a:off x="3686555" y="2322136"/>
-            <a:ext cx="375058" cy="3355261"/>
+            <a:off x="3764594" y="2435685"/>
+            <a:ext cx="218982" cy="3355261"/>
           </a:xfrm>
           <a:custGeom>
             <a:avLst/>
@@ -4247,10 +4280,10 @@
       </p:sp>
       <p:cxnSp>
         <p:nvCxnSpPr>
-          <p:cNvPr id="48" name="Straight Arrow Connector 47">
-            <a:extLst>
-              <a:ext uri="{FF2B5EF4-FFF2-40B4-BE49-F238E27FC236}">
-                <a16:creationId xmlns:a16="http://schemas.microsoft.com/office/drawing/2014/main" id="{88493E5F-30A4-0F4B-896F-15373DD9E98D}"/>
+          <p:cNvPr id="49" name="Straight Arrow Connector 48">
+            <a:extLst>
+              <a:ext uri="{FF2B5EF4-FFF2-40B4-BE49-F238E27FC236}">
+                <a16:creationId xmlns:a16="http://schemas.microsoft.com/office/drawing/2014/main" id="{2193DCE8-ACE4-A34B-94CA-69350F2AEB66}"/>
               </a:ext>
             </a:extLst>
           </p:cNvPr>
@@ -4261,8 +4294,8 @@
         </p:nvCxnSpPr>
         <p:spPr>
           <a:xfrm>
-            <a:off x="2149993" y="4519655"/>
-            <a:ext cx="3336407" cy="0"/>
+            <a:off x="6578082" y="4693753"/>
+            <a:ext cx="1585974" cy="0"/>
           </a:xfrm>
           <a:prstGeom prst="straightConnector1">
             <a:avLst/>
@@ -4271,6 +4304,7 @@
             <a:solidFill>
               <a:srgbClr val="545B64"/>
             </a:solidFill>
+            <a:prstDash val="solid"/>
             <a:headEnd type="arrow" w="med" len="sm"/>
             <a:tailEnd type="arrow" w="med" len="sm"/>
           </a:ln>
@@ -4290,149 +4324,12 @@
           </a:fontRef>
         </p:style>
       </p:cxnSp>
-      <p:cxnSp>
-        <p:nvCxnSpPr>
-          <p:cNvPr id="49" name="Straight Arrow Connector 48">
-            <a:extLst>
-              <a:ext uri="{FF2B5EF4-FFF2-40B4-BE49-F238E27FC236}">
-                <a16:creationId xmlns:a16="http://schemas.microsoft.com/office/drawing/2014/main" id="{2193DCE8-ACE4-A34B-94CA-69350F2AEB66}"/>
-              </a:ext>
-            </a:extLst>
-          </p:cNvPr>
-          <p:cNvCxnSpPr>
-            <a:cxnSpLocks/>
-          </p:cNvCxnSpPr>
-          <p:nvPr/>
-        </p:nvCxnSpPr>
-        <p:spPr>
-          <a:xfrm>
-            <a:off x="5962261" y="4516016"/>
-            <a:ext cx="2509935" cy="9330"/>
-          </a:xfrm>
-          <a:prstGeom prst="straightConnector1">
-            <a:avLst/>
-          </a:prstGeom>
-          <a:ln w="12700">
-            <a:solidFill>
-              <a:srgbClr val="545B64"/>
-            </a:solidFill>
-            <a:prstDash val="lgDash"/>
-            <a:headEnd type="arrow" w="med" len="sm"/>
-            <a:tailEnd type="arrow" w="med" len="sm"/>
-          </a:ln>
-        </p:spPr>
-        <p:style>
-          <a:lnRef idx="1">
-            <a:schemeClr val="accent1"/>
-          </a:lnRef>
-          <a:fillRef idx="0">
-            <a:schemeClr val="accent1"/>
-          </a:fillRef>
-          <a:effectRef idx="0">
-            <a:schemeClr val="accent1"/>
-          </a:effectRef>
-          <a:fontRef idx="minor">
-            <a:schemeClr val="tx1"/>
-          </a:fontRef>
-        </p:style>
-      </p:cxnSp>
-      <p:cxnSp>
-        <p:nvCxnSpPr>
-          <p:cNvPr id="52" name="Straight Arrow Connector 51">
-            <a:extLst>
-              <a:ext uri="{FF2B5EF4-FFF2-40B4-BE49-F238E27FC236}">
-                <a16:creationId xmlns:a16="http://schemas.microsoft.com/office/drawing/2014/main" id="{DC2841E4-793C-4543-AF00-8B5BCBE4383A}"/>
-              </a:ext>
-            </a:extLst>
-          </p:cNvPr>
-          <p:cNvCxnSpPr>
-            <a:cxnSpLocks/>
-          </p:cNvCxnSpPr>
-          <p:nvPr/>
-        </p:nvCxnSpPr>
-        <p:spPr>
-          <a:xfrm>
-            <a:off x="887024" y="6230795"/>
-            <a:ext cx="593809" cy="0"/>
-          </a:xfrm>
-          <a:prstGeom prst="straightConnector1">
-            <a:avLst/>
-          </a:prstGeom>
-          <a:ln w="12700">
-            <a:solidFill>
-              <a:srgbClr val="545B64"/>
-            </a:solidFill>
-            <a:prstDash val="lgDash"/>
-            <a:headEnd type="arrow" w="med" len="sm"/>
-            <a:tailEnd type="arrow" w="med" len="sm"/>
-          </a:ln>
-        </p:spPr>
-        <p:style>
-          <a:lnRef idx="1">
-            <a:schemeClr val="accent1"/>
-          </a:lnRef>
-          <a:fillRef idx="0">
-            <a:schemeClr val="accent1"/>
-          </a:fillRef>
-          <a:effectRef idx="0">
-            <a:schemeClr val="accent1"/>
-          </a:effectRef>
-          <a:fontRef idx="minor">
-            <a:schemeClr val="tx1"/>
-          </a:fontRef>
-        </p:style>
-      </p:cxnSp>
-      <p:cxnSp>
-        <p:nvCxnSpPr>
-          <p:cNvPr id="53" name="Straight Arrow Connector 52">
-            <a:extLst>
-              <a:ext uri="{FF2B5EF4-FFF2-40B4-BE49-F238E27FC236}">
-                <a16:creationId xmlns:a16="http://schemas.microsoft.com/office/drawing/2014/main" id="{BCD1A311-690C-0B4E-9828-3026E83556E9}"/>
-              </a:ext>
-            </a:extLst>
-          </p:cNvPr>
-          <p:cNvCxnSpPr>
-            <a:cxnSpLocks/>
-          </p:cNvCxnSpPr>
-          <p:nvPr/>
-        </p:nvCxnSpPr>
-        <p:spPr>
-          <a:xfrm>
-            <a:off x="887024" y="5978775"/>
-            <a:ext cx="593809" cy="0"/>
-          </a:xfrm>
-          <a:prstGeom prst="straightConnector1">
-            <a:avLst/>
-          </a:prstGeom>
-          <a:ln w="12700">
-            <a:solidFill>
-              <a:srgbClr val="545B64"/>
-            </a:solidFill>
-            <a:headEnd type="arrow" w="med" len="sm"/>
-            <a:tailEnd type="arrow" w="med" len="sm"/>
-          </a:ln>
-        </p:spPr>
-        <p:style>
-          <a:lnRef idx="1">
-            <a:schemeClr val="accent1"/>
-          </a:lnRef>
-          <a:fillRef idx="0">
-            <a:schemeClr val="accent1"/>
-          </a:fillRef>
-          <a:effectRef idx="0">
-            <a:schemeClr val="accent1"/>
-          </a:effectRef>
-          <a:fontRef idx="minor">
-            <a:schemeClr val="tx1"/>
-          </a:fontRef>
-        </p:style>
-      </p:cxnSp>
-      <p:sp>
-        <p:nvSpPr>
-          <p:cNvPr id="54" name="TextBox 53">
-            <a:extLst>
-              <a:ext uri="{FF2B5EF4-FFF2-40B4-BE49-F238E27FC236}">
-                <a16:creationId xmlns:a16="http://schemas.microsoft.com/office/drawing/2014/main" id="{2AE969AF-346F-FE4A-A4AC-F2D2E9D0FBD2}"/>
+      <p:sp>
+        <p:nvSpPr>
+          <p:cNvPr id="71" name="TextBox 70">
+            <a:extLst>
+              <a:ext uri="{FF2B5EF4-FFF2-40B4-BE49-F238E27FC236}">
+                <a16:creationId xmlns:a16="http://schemas.microsoft.com/office/drawing/2014/main" id="{CF275322-8821-7240-9DD9-59D35F667125}"/>
               </a:ext>
             </a:extLst>
           </p:cNvPr>
@@ -4441,83 +4338,7 @@
         </p:nvSpPr>
         <p:spPr>
           <a:xfrm>
-            <a:off x="1510673" y="5840437"/>
-            <a:ext cx="1769070" cy="307777"/>
-          </a:xfrm>
-          <a:prstGeom prst="rect">
-            <a:avLst/>
-          </a:prstGeom>
-          <a:noFill/>
-        </p:spPr>
-        <p:txBody>
-          <a:bodyPr wrap="square" rtlCol="0">
-            <a:spAutoFit/>
-          </a:bodyPr>
-          <a:lstStyle/>
-          <a:p>
-            <a:r>
-              <a:rPr lang="en-US" sz="1400" dirty="0">
-                <a:latin typeface="Arial" panose="020B0604020202020204" pitchFamily="34" charset="0"/>
-                <a:cs typeface="Arial" panose="020B0604020202020204" pitchFamily="34" charset="0"/>
-              </a:rPr>
-              <a:t>Mirror data traffic</a:t>
-            </a:r>
-          </a:p>
-        </p:txBody>
-      </p:sp>
-      <p:sp>
-        <p:nvSpPr>
-          <p:cNvPr id="55" name="TextBox 54">
-            <a:extLst>
-              <a:ext uri="{FF2B5EF4-FFF2-40B4-BE49-F238E27FC236}">
-                <a16:creationId xmlns:a16="http://schemas.microsoft.com/office/drawing/2014/main" id="{E02A861B-E56A-5242-875D-B010EC62EFC7}"/>
-              </a:ext>
-            </a:extLst>
-          </p:cNvPr>
-          <p:cNvSpPr txBox="1"/>
-          <p:nvPr/>
-        </p:nvSpPr>
-        <p:spPr>
-          <a:xfrm>
-            <a:off x="1506912" y="6078155"/>
-            <a:ext cx="1769070" cy="307777"/>
-          </a:xfrm>
-          <a:prstGeom prst="rect">
-            <a:avLst/>
-          </a:prstGeom>
-          <a:noFill/>
-        </p:spPr>
-        <p:txBody>
-          <a:bodyPr wrap="square" rtlCol="0">
-            <a:spAutoFit/>
-          </a:bodyPr>
-          <a:lstStyle/>
-          <a:p>
-            <a:r>
-              <a:rPr lang="en-US" sz="1400" dirty="0">
-                <a:latin typeface="Arial" panose="020B0604020202020204" pitchFamily="34" charset="0"/>
-                <a:cs typeface="Arial" panose="020B0604020202020204" pitchFamily="34" charset="0"/>
-              </a:rPr>
-              <a:t>Mirror health check</a:t>
-            </a:r>
-          </a:p>
-        </p:txBody>
-      </p:sp>
-      <p:sp>
-        <p:nvSpPr>
-          <p:cNvPr id="71" name="TextBox 70">
-            <a:extLst>
-              <a:ext uri="{FF2B5EF4-FFF2-40B4-BE49-F238E27FC236}">
-                <a16:creationId xmlns:a16="http://schemas.microsoft.com/office/drawing/2014/main" id="{CF275322-8821-7240-9DD9-59D35F667125}"/>
-              </a:ext>
-            </a:extLst>
-          </p:cNvPr>
-          <p:cNvSpPr txBox="1"/>
-          <p:nvPr/>
-        </p:nvSpPr>
-        <p:spPr>
-          <a:xfrm>
-            <a:off x="975221" y="2439142"/>
+            <a:off x="984044" y="2510166"/>
             <a:ext cx="1769070" cy="276999"/>
           </a:xfrm>
           <a:prstGeom prst="rect">
@@ -4724,8 +4545,8 @@
         </p:nvSpPr>
         <p:spPr bwMode="auto">
           <a:xfrm>
-            <a:off x="363205" y="1328654"/>
-            <a:ext cx="9564566" cy="4135075"/>
+            <a:off x="363204" y="1328654"/>
+            <a:ext cx="9649475" cy="4135075"/>
           </a:xfrm>
           <a:prstGeom prst="rect">
             <a:avLst/>
@@ -4809,7 +4630,7 @@
         </p:blipFill>
         <p:spPr bwMode="auto">
           <a:xfrm>
-            <a:off x="4827437" y="3176105"/>
+            <a:off x="4827437" y="3318153"/>
             <a:ext cx="274637" cy="274638"/>
           </a:xfrm>
           <a:prstGeom prst="rect">
@@ -4869,7 +4690,7 @@
         </p:blipFill>
         <p:spPr bwMode="auto">
           <a:xfrm>
-            <a:off x="806688" y="3271546"/>
+            <a:off x="806688" y="3313870"/>
             <a:ext cx="274637" cy="274638"/>
           </a:xfrm>
           <a:prstGeom prst="rect">
@@ -4975,7 +4796,7 @@
         <p:spPr>
           <a:xfrm>
             <a:off x="4827436" y="1626255"/>
-            <a:ext cx="2133548" cy="1226818"/>
+            <a:ext cx="2133548" cy="1325356"/>
           </a:xfrm>
           <a:prstGeom prst="rect">
             <a:avLst/>
@@ -5101,13 +4922,15 @@
               </a:ext>
             </a:extLst>
           </p:cNvPr>
-          <p:cNvCxnSpPr/>
+          <p:cNvCxnSpPr>
+            <a:endCxn id="39" idx="2"/>
+          </p:cNvCxnSpPr>
           <p:nvPr/>
         </p:nvCxnSpPr>
         <p:spPr>
           <a:xfrm flipV="1">
-            <a:off x="3879579" y="3570015"/>
-            <a:ext cx="0" cy="242224"/>
+            <a:off x="3879579" y="3827475"/>
+            <a:ext cx="0" cy="167476"/>
           </a:xfrm>
           <a:prstGeom prst="straightConnector1">
             <a:avLst/>
@@ -5149,8 +4972,8 @@
         </p:nvSpPr>
         <p:spPr>
           <a:xfrm>
-            <a:off x="1167493" y="1983462"/>
-            <a:ext cx="5410589" cy="705242"/>
+            <a:off x="1167493" y="1983461"/>
+            <a:ext cx="5410589" cy="865213"/>
           </a:xfrm>
           <a:prstGeom prst="rect">
             <a:avLst/>
@@ -5236,8 +5059,25 @@
                 <a:latin typeface="Arial" panose="020B0604020202020204" pitchFamily="34" charset="0"/>
                 <a:cs typeface="Arial" panose="020B0604020202020204" pitchFamily="34" charset="0"/>
               </a:rPr>
-              <a:t>Auto Scaling group</a:t>
-            </a:r>
+              <a:t>Auto Scaling </a:t>
+            </a:r>
+            <a:r>
+              <a:rPr lang="en-US" sz="1200" dirty="0" smtClean="0">
+                <a:solidFill>
+                  <a:srgbClr val="D86613"/>
+                </a:solidFill>
+                <a:latin typeface="Arial" panose="020B0604020202020204" pitchFamily="34" charset="0"/>
+                <a:cs typeface="Arial" panose="020B0604020202020204" pitchFamily="34" charset="0"/>
+              </a:rPr>
+              <a:t>group</a:t>
+            </a:r>
+            <a:endParaRPr lang="en-US" sz="1200" dirty="0">
+              <a:solidFill>
+                <a:srgbClr val="D86613"/>
+              </a:solidFill>
+              <a:latin typeface="Arial" panose="020B0604020202020204" pitchFamily="34" charset="0"/>
+              <a:cs typeface="Arial" panose="020B0604020202020204" pitchFamily="34" charset="0"/>
+            </a:endParaRPr>
           </a:p>
         </p:txBody>
       </p:sp>
@@ -5315,7 +5155,7 @@
         </p:nvSpPr>
         <p:spPr bwMode="auto">
           <a:xfrm>
-            <a:off x="7530037" y="987029"/>
+            <a:off x="7632907" y="987029"/>
             <a:ext cx="2285329" cy="4620284"/>
           </a:xfrm>
           <a:prstGeom prst="rect">
@@ -5417,7 +5257,7 @@
         </p:blipFill>
         <p:spPr bwMode="auto">
           <a:xfrm>
-            <a:off x="7611080" y="3179211"/>
+            <a:off x="7713950" y="3321259"/>
             <a:ext cx="274637" cy="274638"/>
           </a:xfrm>
           <a:prstGeom prst="rect">
@@ -5477,7 +5317,7 @@
         </p:blipFill>
         <p:spPr bwMode="auto">
           <a:xfrm>
-            <a:off x="1692793" y="4335360"/>
+            <a:off x="1639979" y="4344346"/>
             <a:ext cx="457200" cy="457200"/>
           </a:xfrm>
           <a:prstGeom prst="rect">
@@ -5537,7 +5377,7 @@
         </p:blipFill>
         <p:spPr bwMode="auto">
           <a:xfrm>
-            <a:off x="5551715" y="4335360"/>
+            <a:off x="5659496" y="4344346"/>
             <a:ext cx="457200" cy="457200"/>
           </a:xfrm>
           <a:prstGeom prst="rect">
@@ -5597,7 +5437,7 @@
         </p:blipFill>
         <p:spPr bwMode="auto">
           <a:xfrm>
-            <a:off x="1640428" y="2032349"/>
+            <a:off x="1639979" y="2103373"/>
             <a:ext cx="457200" cy="457200"/>
           </a:xfrm>
           <a:prstGeom prst="rect">
@@ -5642,7 +5482,7 @@
         </p:nvSpPr>
         <p:spPr>
           <a:xfrm>
-            <a:off x="8318219" y="4820495"/>
+            <a:off x="8386799" y="4933465"/>
             <a:ext cx="793752" cy="279013"/>
           </a:xfrm>
           <a:prstGeom prst="rect">
@@ -5681,8 +5521,8 @@
         </p:nvSpPr>
         <p:spPr>
           <a:xfrm>
-            <a:off x="8095476" y="4086808"/>
-            <a:ext cx="1239238" cy="979710"/>
+            <a:off x="8164056" y="4222807"/>
+            <a:ext cx="1239238" cy="1021427"/>
           </a:xfrm>
           <a:prstGeom prst="rect">
             <a:avLst/>
@@ -5761,7 +5601,7 @@
         </p:blipFill>
         <p:spPr bwMode="auto">
           <a:xfrm>
-            <a:off x="8486495" y="4402342"/>
+            <a:off x="8555075" y="4515312"/>
             <a:ext cx="457200" cy="457200"/>
           </a:xfrm>
           <a:prstGeom prst="rect">
@@ -5830,7 +5670,7 @@
         </p:blipFill>
         <p:spPr bwMode="auto">
           <a:xfrm>
-            <a:off x="5693685" y="2032349"/>
+            <a:off x="5659496" y="2103373"/>
             <a:ext cx="457200" cy="457200"/>
           </a:xfrm>
           <a:prstGeom prst="rect">
@@ -5875,7 +5715,7 @@
         </p:nvSpPr>
         <p:spPr>
           <a:xfrm>
-            <a:off x="5016655" y="2442594"/>
+            <a:off x="5003561" y="2513618"/>
             <a:ext cx="1769070" cy="276999"/>
           </a:xfrm>
           <a:prstGeom prst="rect">
@@ -5911,6 +5751,155 @@
           </a:p>
         </p:txBody>
       </p:sp>
+      <p:sp>
+        <p:nvSpPr>
+          <p:cNvPr id="43" name="Rectangle 42">
+            <a:extLst>
+              <a:ext uri="{FF2B5EF4-FFF2-40B4-BE49-F238E27FC236}">
+                <a16:creationId xmlns:a16="http://schemas.microsoft.com/office/drawing/2014/main" id="{B1844CBB-737E-C049-891C-1F2168761D96}"/>
+              </a:ext>
+            </a:extLst>
+          </p:cNvPr>
+          <p:cNvSpPr/>
+          <p:nvPr/>
+        </p:nvSpPr>
+        <p:spPr>
+          <a:xfrm>
+            <a:off x="7713950" y="1618929"/>
+            <a:ext cx="2133548" cy="1332682"/>
+          </a:xfrm>
+          <a:prstGeom prst="rect">
+            <a:avLst/>
+          </a:prstGeom>
+          <a:solidFill>
+            <a:srgbClr val="1D8900">
+              <a:alpha val="9804"/>
+            </a:srgbClr>
+          </a:solidFill>
+          <a:ln w="12700">
+            <a:noFill/>
+            <a:prstDash val="dash"/>
+          </a:ln>
+        </p:spPr>
+        <p:style>
+          <a:lnRef idx="2">
+            <a:schemeClr val="accent1">
+              <a:shade val="50000"/>
+            </a:schemeClr>
+          </a:lnRef>
+          <a:fillRef idx="1">
+            <a:schemeClr val="accent1"/>
+          </a:fillRef>
+          <a:effectRef idx="0">
+            <a:schemeClr val="accent1"/>
+          </a:effectRef>
+          <a:fontRef idx="minor">
+            <a:schemeClr val="lt1"/>
+          </a:fontRef>
+        </p:style>
+        <p:txBody>
+          <a:bodyPr lIns="338328"/>
+          <a:lstStyle/>
+          <a:p>
+            <a:pPr eaLnBrk="1" fontAlgn="auto" hangingPunct="1">
+              <a:spcBef>
+                <a:spcPts val="0"/>
+              </a:spcBef>
+              <a:spcAft>
+                <a:spcPts val="0"/>
+              </a:spcAft>
+              <a:defRPr/>
+            </a:pPr>
+            <a:r>
+              <a:rPr lang="en-US" sz="1200" dirty="0">
+                <a:solidFill>
+                  <a:srgbClr val="1E8900"/>
+                </a:solidFill>
+                <a:latin typeface="Arial" panose="020B0604020202020204" pitchFamily="34" charset="0"/>
+                <a:cs typeface="Arial" panose="020B0604020202020204" pitchFamily="34" charset="0"/>
+              </a:rPr>
+              <a:t>Public </a:t>
+            </a:r>
+            <a:r>
+              <a:rPr lang="en-US" sz="1200" dirty="0" smtClean="0">
+                <a:solidFill>
+                  <a:srgbClr val="1E8900"/>
+                </a:solidFill>
+                <a:latin typeface="Arial" panose="020B0604020202020204" pitchFamily="34" charset="0"/>
+                <a:cs typeface="Arial" panose="020B0604020202020204" pitchFamily="34" charset="0"/>
+              </a:rPr>
+              <a:t>subnet (not used)</a:t>
+            </a:r>
+            <a:endParaRPr lang="en-US" sz="1200" dirty="0">
+              <a:solidFill>
+                <a:srgbClr val="1E8900"/>
+              </a:solidFill>
+              <a:latin typeface="Arial" panose="020B0604020202020204" pitchFamily="34" charset="0"/>
+              <a:cs typeface="Arial" panose="020B0604020202020204" pitchFamily="34" charset="0"/>
+            </a:endParaRPr>
+          </a:p>
+        </p:txBody>
+      </p:sp>
+      <p:pic>
+        <p:nvPicPr>
+          <p:cNvPr id="45" name="Graphic 13">
+            <a:extLst>
+              <a:ext uri="{FF2B5EF4-FFF2-40B4-BE49-F238E27FC236}">
+                <a16:creationId xmlns:a16="http://schemas.microsoft.com/office/drawing/2014/main" id="{70274855-208B-F84A-91BD-0E2073330EBD}"/>
+              </a:ext>
+            </a:extLst>
+          </p:cNvPr>
+          <p:cNvPicPr>
+            <a:picLocks noChangeAspect="1" noChangeArrowheads="1"/>
+          </p:cNvPicPr>
+          <p:nvPr/>
+        </p:nvPicPr>
+        <p:blipFill>
+          <a:blip r:embed="rId13">
+            <a:extLst>
+              <a:ext uri="{28A0092B-C50C-407E-A947-70E740481C1C}">
+                <a14:useLocalDpi xmlns:a14="http://schemas.microsoft.com/office/drawing/2010/main" val="0"/>
+              </a:ext>
+            </a:extLst>
+          </a:blip>
+          <a:srcRect/>
+          <a:stretch>
+            <a:fillRect/>
+          </a:stretch>
+        </p:blipFill>
+        <p:spPr bwMode="auto">
+          <a:xfrm>
+            <a:off x="7713950" y="1614050"/>
+            <a:ext cx="273050" cy="274637"/>
+          </a:xfrm>
+          <a:prstGeom prst="rect">
+            <a:avLst/>
+          </a:prstGeom>
+          <a:noFill/>
+          <a:ln>
+            <a:noFill/>
+          </a:ln>
+          <a:extLst>
+            <a:ext uri="{909E8E84-426E-40DD-AFC4-6F175D3DCCD1}">
+              <a14:hiddenFill xmlns:a14="http://schemas.microsoft.com/office/drawing/2010/main">
+                <a:solidFill>
+                  <a:srgbClr val="FFFFFF"/>
+                </a:solidFill>
+              </a14:hiddenFill>
+            </a:ext>
+            <a:ext uri="{91240B29-F687-4F45-9708-019B960494DF}">
+              <a14:hiddenLine xmlns:a14="http://schemas.microsoft.com/office/drawing/2010/main" w="9525">
+                <a:solidFill>
+                  <a:srgbClr val="000000"/>
+                </a:solidFill>
+                <a:miter lim="800000"/>
+                <a:headEnd/>
+                <a:tailEnd/>
+              </a14:hiddenLine>
+            </a:ext>
+          </a:extLst>
+        </p:spPr>
+      </p:pic>
     </p:spTree>
     <p:extLst>
       <p:ext uri="{BB962C8B-B14F-4D97-AF65-F5344CB8AC3E}">
@@ -6436,7 +6425,7 @@
           <a:blip r:embed="rId2">
             <a:extLst>
               <a:ext uri="{96DAC541-7B7A-43D3-8B79-37D633B846F1}">
-                <asvg:svgBlip xmlns:asvg="http://schemas.microsoft.com/office/drawing/2016/SVG/main" xmlns="" r:embed="rId3"/>
+                <asvg:svgBlip xmlns="" xmlns:asvg="http://schemas.microsoft.com/office/drawing/2016/SVG/main" r:embed="rId3"/>
               </a:ext>
             </a:extLst>
           </a:blip>
@@ -6472,7 +6461,7 @@
           <a:blip r:embed="rId4">
             <a:extLst>
               <a:ext uri="{96DAC541-7B7A-43D3-8B79-37D633B846F1}">
-                <asvg:svgBlip xmlns:asvg="http://schemas.microsoft.com/office/drawing/2016/SVG/main" xmlns="" r:embed="rId5"/>
+                <asvg:svgBlip xmlns="" xmlns:asvg="http://schemas.microsoft.com/office/drawing/2016/SVG/main" r:embed="rId5"/>
               </a:ext>
             </a:extLst>
           </a:blip>
@@ -6732,7 +6721,7 @@
           <a:blip r:embed="rId6">
             <a:extLst>
               <a:ext uri="{96DAC541-7B7A-43D3-8B79-37D633B846F1}">
-                <asvg:svgBlip xmlns:asvg="http://schemas.microsoft.com/office/drawing/2016/SVG/main" xmlns="" r:embed="rId11"/>
+                <asvg:svgBlip xmlns="" xmlns:asvg="http://schemas.microsoft.com/office/drawing/2016/SVG/main" r:embed="rId11"/>
               </a:ext>
             </a:extLst>
           </a:blip>
@@ -9334,6 +9323,107 @@
           </a:p>
         </p:txBody>
       </p:sp>
+      <p:cxnSp>
+        <p:nvCxnSpPr>
+          <p:cNvPr id="60" name="Straight Arrow Connector 59">
+            <a:extLst>
+              <a:ext uri="{FF2B5EF4-FFF2-40B4-BE49-F238E27FC236}">
+                <a16:creationId xmlns:a16="http://schemas.microsoft.com/office/drawing/2014/main" id="{88493E5F-30A4-0F4B-896F-15373DD9E98D}"/>
+              </a:ext>
+            </a:extLst>
+          </p:cNvPr>
+          <p:cNvCxnSpPr>
+            <a:cxnSpLocks/>
+          </p:cNvCxnSpPr>
+          <p:nvPr/>
+        </p:nvCxnSpPr>
+        <p:spPr>
+          <a:xfrm>
+            <a:off x="5446525" y="6048622"/>
+            <a:ext cx="3401722" cy="0"/>
+          </a:xfrm>
+          <a:prstGeom prst="straightConnector1">
+            <a:avLst/>
+          </a:prstGeom>
+          <a:ln w="12700">
+            <a:solidFill>
+              <a:srgbClr val="545B64"/>
+            </a:solidFill>
+            <a:headEnd type="arrow" w="med" len="sm"/>
+            <a:tailEnd type="arrow" w="med" len="sm"/>
+          </a:ln>
+        </p:spPr>
+        <p:style>
+          <a:lnRef idx="1">
+            <a:schemeClr val="accent1"/>
+          </a:lnRef>
+          <a:fillRef idx="0">
+            <a:schemeClr val="accent1"/>
+          </a:fillRef>
+          <a:effectRef idx="0">
+            <a:schemeClr val="accent1"/>
+          </a:effectRef>
+          <a:fontRef idx="minor">
+            <a:schemeClr val="tx1"/>
+          </a:fontRef>
+        </p:style>
+      </p:cxnSp>
+      <p:sp>
+        <p:nvSpPr>
+          <p:cNvPr id="61" name="TextBox 60">
+            <a:extLst>
+              <a:ext uri="{FF2B5EF4-FFF2-40B4-BE49-F238E27FC236}">
+                <a16:creationId xmlns:a16="http://schemas.microsoft.com/office/drawing/2014/main" id="{6B638165-16FA-A646-A545-A7BD93A3AF6A}"/>
+              </a:ext>
+            </a:extLst>
+          </p:cNvPr>
+          <p:cNvSpPr txBox="1"/>
+          <p:nvPr/>
+        </p:nvSpPr>
+        <p:spPr>
+          <a:xfrm>
+            <a:off x="6288309" y="6043787"/>
+            <a:ext cx="1769070" cy="461665"/>
+          </a:xfrm>
+          <a:prstGeom prst="rect">
+            <a:avLst/>
+          </a:prstGeom>
+          <a:noFill/>
+        </p:spPr>
+        <p:txBody>
+          <a:bodyPr wrap="square" rtlCol="0">
+            <a:spAutoFit/>
+          </a:bodyPr>
+          <a:lstStyle/>
+          <a:p>
+            <a:pPr algn="ctr"/>
+            <a:r>
+              <a:rPr lang="en-US" sz="1200" i="1" dirty="0" smtClean="0">
+                <a:latin typeface="Arial" panose="020B0604020202020204" pitchFamily="34" charset="0"/>
+                <a:cs typeface="Arial" panose="020B0604020202020204" pitchFamily="34" charset="0"/>
+              </a:rPr>
+              <a:t>Real-time</a:t>
+            </a:r>
+            <a:br>
+              <a:rPr lang="en-US" sz="1200" i="1" dirty="0" smtClean="0">
+                <a:latin typeface="Arial" panose="020B0604020202020204" pitchFamily="34" charset="0"/>
+                <a:cs typeface="Arial" panose="020B0604020202020204" pitchFamily="34" charset="0"/>
+              </a:rPr>
+            </a:br>
+            <a:r>
+              <a:rPr lang="en-US" sz="1200" i="1" dirty="0" smtClean="0">
+                <a:latin typeface="Arial" panose="020B0604020202020204" pitchFamily="34" charset="0"/>
+                <a:cs typeface="Arial" panose="020B0604020202020204" pitchFamily="34" charset="0"/>
+              </a:rPr>
+              <a:t>data replication</a:t>
+            </a:r>
+            <a:endParaRPr lang="en-US" sz="1200" i="1" dirty="0">
+              <a:latin typeface="Arial" panose="020B0604020202020204" pitchFamily="34" charset="0"/>
+              <a:cs typeface="Arial" panose="020B0604020202020204" pitchFamily="34" charset="0"/>
+            </a:endParaRPr>
+          </a:p>
+        </p:txBody>
+      </p:sp>
     </p:spTree>
     <p:extLst>
       <p:ext uri="{BB962C8B-B14F-4D97-AF65-F5344CB8AC3E}">
@@ -9597,7 +9687,7 @@
           <a:blip r:embed="rId2">
             <a:extLst>
               <a:ext uri="{96DAC541-7B7A-43D3-8B79-37D633B846F1}">
-                <asvg:svgBlip xmlns:asvg="http://schemas.microsoft.com/office/drawing/2016/SVG/main" xmlns="" r:embed="rId3"/>
+                <asvg:svgBlip xmlns="" xmlns:asvg="http://schemas.microsoft.com/office/drawing/2016/SVG/main" r:embed="rId3"/>
               </a:ext>
             </a:extLst>
           </a:blip>
@@ -9720,7 +9810,7 @@
           <a:blip r:embed="rId4">
             <a:extLst>
               <a:ext uri="{96DAC541-7B7A-43D3-8B79-37D633B846F1}">
-                <asvg:svgBlip xmlns:asvg="http://schemas.microsoft.com/office/drawing/2016/SVG/main" xmlns="" r:embed="rId5"/>
+                <asvg:svgBlip xmlns="" xmlns:asvg="http://schemas.microsoft.com/office/drawing/2016/SVG/main" r:embed="rId5"/>
               </a:ext>
             </a:extLst>
           </a:blip>
@@ -9886,7 +9976,7 @@
           <a:blip r:embed="rId7">
             <a:extLst>
               <a:ext uri="{96DAC541-7B7A-43D3-8B79-37D633B846F1}">
-                <asvg:svgBlip xmlns:asvg="http://schemas.microsoft.com/office/drawing/2016/SVG/main" xmlns="" r:embed="rId9"/>
+                <asvg:svgBlip xmlns="" xmlns:asvg="http://schemas.microsoft.com/office/drawing/2016/SVG/main" r:embed="rId9"/>
               </a:ext>
             </a:extLst>
           </a:blip>
@@ -10583,7 +10673,7 @@
           <a:blip r:embed="rId2">
             <a:extLst>
               <a:ext uri="{96DAC541-7B7A-43D3-8B79-37D633B846F1}">
-                <asvg:svgBlip xmlns:asvg="http://schemas.microsoft.com/office/drawing/2016/SVG/main" xmlns="" r:embed="rId3"/>
+                <asvg:svgBlip xmlns="" xmlns:asvg="http://schemas.microsoft.com/office/drawing/2016/SVG/main" r:embed="rId3"/>
               </a:ext>
             </a:extLst>
           </a:blip>
@@ -10619,7 +10709,7 @@
           <a:blip r:embed="rId4">
             <a:extLst>
               <a:ext uri="{96DAC541-7B7A-43D3-8B79-37D633B846F1}">
-                <asvg:svgBlip xmlns:asvg="http://schemas.microsoft.com/office/drawing/2016/SVG/main" xmlns="" r:embed="rId5"/>
+                <asvg:svgBlip xmlns="" xmlns:asvg="http://schemas.microsoft.com/office/drawing/2016/SVG/main" r:embed="rId5"/>
               </a:ext>
             </a:extLst>
           </a:blip>
@@ -10766,7 +10856,7 @@
           <a:blip r:embed="rId6">
             <a:extLst>
               <a:ext uri="{96DAC541-7B7A-43D3-8B79-37D633B846F1}">
-                <asvg:svgBlip xmlns:asvg="http://schemas.microsoft.com/office/drawing/2016/SVG/main" xmlns="" r:embed="rId7"/>
+                <asvg:svgBlip xmlns="" xmlns:asvg="http://schemas.microsoft.com/office/drawing/2016/SVG/main" r:embed="rId7"/>
               </a:ext>
             </a:extLst>
           </a:blip>
@@ -10844,7 +10934,7 @@
           <a:blip r:embed="rId8">
             <a:extLst>
               <a:ext uri="{96DAC541-7B7A-43D3-8B79-37D633B846F1}">
-                <asvg:svgBlip xmlns:asvg="http://schemas.microsoft.com/office/drawing/2016/SVG/main" xmlns="" r:embed="rId9"/>
+                <asvg:svgBlip xmlns="" xmlns:asvg="http://schemas.microsoft.com/office/drawing/2016/SVG/main" r:embed="rId9"/>
               </a:ext>
             </a:extLst>
           </a:blip>
@@ -10932,7 +11022,7 @@
           <a:blip r:embed="rId10">
             <a:extLst>
               <a:ext uri="{96DAC541-7B7A-43D3-8B79-37D633B846F1}">
-                <asvg:svgBlip xmlns:asvg="http://schemas.microsoft.com/office/drawing/2016/SVG/main" xmlns="" r:embed="rId11"/>
+                <asvg:svgBlip xmlns="" xmlns:asvg="http://schemas.microsoft.com/office/drawing/2016/SVG/main" r:embed="rId11"/>
               </a:ext>
             </a:extLst>
           </a:blip>
@@ -11208,7 +11298,7 @@
           <a:blip r:embed="rId6">
             <a:extLst>
               <a:ext uri="{96DAC541-7B7A-43D3-8B79-37D633B846F1}">
-                <asvg:svgBlip xmlns:asvg="http://schemas.microsoft.com/office/drawing/2016/SVG/main" xmlns="" r:embed="rId7"/>
+                <asvg:svgBlip xmlns="" xmlns:asvg="http://schemas.microsoft.com/office/drawing/2016/SVG/main" r:embed="rId7"/>
               </a:ext>
             </a:extLst>
           </a:blip>
@@ -11311,7 +11401,7 @@
           <a:blip r:embed="rId6">
             <a:extLst>
               <a:ext uri="{96DAC541-7B7A-43D3-8B79-37D633B846F1}">
-                <asvg:svgBlip xmlns:asvg="http://schemas.microsoft.com/office/drawing/2016/SVG/main" xmlns="" r:embed="rId7"/>
+                <asvg:svgBlip xmlns="" xmlns:asvg="http://schemas.microsoft.com/office/drawing/2016/SVG/main" r:embed="rId7"/>
               </a:ext>
             </a:extLst>
           </a:blip>
@@ -11431,7 +11521,7 @@
           <a:blip r:embed="rId8">
             <a:extLst>
               <a:ext uri="{96DAC541-7B7A-43D3-8B79-37D633B846F1}">
-                <asvg:svgBlip xmlns:asvg="http://schemas.microsoft.com/office/drawing/2016/SVG/main" xmlns="" r:embed="rId9"/>
+                <asvg:svgBlip xmlns="" xmlns:asvg="http://schemas.microsoft.com/office/drawing/2016/SVG/main" r:embed="rId9"/>
               </a:ext>
             </a:extLst>
           </a:blip>
@@ -11506,7 +11596,7 @@
           <a:blip r:embed="rId8">
             <a:extLst>
               <a:ext uri="{96DAC541-7B7A-43D3-8B79-37D633B846F1}">
-                <asvg:svgBlip xmlns:asvg="http://schemas.microsoft.com/office/drawing/2016/SVG/main" xmlns="" r:embed="rId9"/>
+                <asvg:svgBlip xmlns="" xmlns:asvg="http://schemas.microsoft.com/office/drawing/2016/SVG/main" r:embed="rId9"/>
               </a:ext>
             </a:extLst>
           </a:blip>
@@ -11698,7 +11788,7 @@
           <a:blip r:embed="rId12">
             <a:extLst>
               <a:ext uri="{96DAC541-7B7A-43D3-8B79-37D633B846F1}">
-                <asvg:svgBlip xmlns:asvg="http://schemas.microsoft.com/office/drawing/2016/SVG/main" xmlns="" r:embed="rId13"/>
+                <asvg:svgBlip xmlns="" xmlns:asvg="http://schemas.microsoft.com/office/drawing/2016/SVG/main" r:embed="rId13"/>
               </a:ext>
             </a:extLst>
           </a:blip>
@@ -12166,7 +12256,7 @@
           <a:blip r:embed="rId14">
             <a:extLst>
               <a:ext uri="{96DAC541-7B7A-43D3-8B79-37D633B846F1}">
-                <asvg:svgBlip xmlns:asvg="http://schemas.microsoft.com/office/drawing/2016/SVG/main" xmlns="" r:embed="rId15"/>
+                <asvg:svgBlip xmlns="" xmlns:asvg="http://schemas.microsoft.com/office/drawing/2016/SVG/main" r:embed="rId15"/>
               </a:ext>
             </a:extLst>
           </a:blip>
@@ -12280,7 +12370,7 @@
           <a:blip r:embed="rId16">
             <a:extLst>
               <a:ext uri="{96DAC541-7B7A-43D3-8B79-37D633B846F1}">
-                <asvg:svgBlip xmlns:asvg="http://schemas.microsoft.com/office/drawing/2016/SVG/main" xmlns="" r:embed="rId17"/>
+                <asvg:svgBlip xmlns="" xmlns:asvg="http://schemas.microsoft.com/office/drawing/2016/SVG/main" r:embed="rId17"/>
               </a:ext>
             </a:extLst>
           </a:blip>
@@ -12355,7 +12445,7 @@
           <a:blip r:embed="rId18">
             <a:extLst>
               <a:ext uri="{96DAC541-7B7A-43D3-8B79-37D633B846F1}">
-                <asvg:svgBlip xmlns:asvg="http://schemas.microsoft.com/office/drawing/2016/SVG/main" xmlns="" r:embed="rId19"/>
+                <asvg:svgBlip xmlns="" xmlns:asvg="http://schemas.microsoft.com/office/drawing/2016/SVG/main" r:embed="rId19"/>
               </a:ext>
             </a:extLst>
           </a:blip>
@@ -12496,17 +12586,7 @@
                 <a:latin typeface="Arial" panose="020B0604020202020204" pitchFamily="34" charset="0"/>
                 <a:cs typeface="Arial" panose="020B0604020202020204" pitchFamily="34" charset="0"/>
               </a:rPr>
-              <a:t>If we need a diagram like this (private subnets only), model it on </a:t>
-            </a:r>
-            <a:r>
-              <a:rPr lang="en-US" sz="1200" dirty="0" smtClean="0">
-                <a:solidFill>
-                  <a:srgbClr val="FF0000"/>
-                </a:solidFill>
-                <a:latin typeface="Arial" panose="020B0604020202020204" pitchFamily="34" charset="0"/>
-                <a:cs typeface="Arial" panose="020B0604020202020204" pitchFamily="34" charset="0"/>
-              </a:rPr>
-              <a:t>the main diagram.</a:t>
+              <a:t>If we need a diagram like this (private subnets only), model it on the main diagram.</a:t>
             </a:r>
             <a:endParaRPr lang="en-US" sz="1200" dirty="0">
               <a:solidFill>

</xml_diff>